<commit_message>
some updates to ppt 2, sketches toward exercises for 3 and 4
</commit_message>
<xml_diff>
--- a/presentations/2 - About R and RStudio.pptx
+++ b/presentations/2 - About R and RStudio.pptx
@@ -5,7 +5,7 @@
     <p:sldMasterId id="2147483648" r:id="rId1"/>
   </p:sldMasterIdLst>
   <p:notesMasterIdLst>
-    <p:notesMasterId r:id="rId26"/>
+    <p:notesMasterId r:id="rId28"/>
   </p:notesMasterIdLst>
   <p:sldIdLst>
     <p:sldId id="256" r:id="rId2"/>
@@ -16,22 +16,24 @@
     <p:sldId id="435" r:id="rId7"/>
     <p:sldId id="417" r:id="rId8"/>
     <p:sldId id="380" r:id="rId9"/>
-    <p:sldId id="418" r:id="rId10"/>
-    <p:sldId id="390" r:id="rId11"/>
-    <p:sldId id="409" r:id="rId12"/>
-    <p:sldId id="410" r:id="rId13"/>
-    <p:sldId id="262" r:id="rId14"/>
-    <p:sldId id="300" r:id="rId15"/>
-    <p:sldId id="301" r:id="rId16"/>
-    <p:sldId id="302" r:id="rId17"/>
-    <p:sldId id="330" r:id="rId18"/>
-    <p:sldId id="419" r:id="rId19"/>
-    <p:sldId id="332" r:id="rId20"/>
-    <p:sldId id="430" r:id="rId21"/>
-    <p:sldId id="406" r:id="rId22"/>
-    <p:sldId id="408" r:id="rId23"/>
-    <p:sldId id="432" r:id="rId24"/>
-    <p:sldId id="431" r:id="rId25"/>
+    <p:sldId id="438" r:id="rId10"/>
+    <p:sldId id="418" r:id="rId11"/>
+    <p:sldId id="437" r:id="rId12"/>
+    <p:sldId id="390" r:id="rId13"/>
+    <p:sldId id="409" r:id="rId14"/>
+    <p:sldId id="410" r:id="rId15"/>
+    <p:sldId id="262" r:id="rId16"/>
+    <p:sldId id="300" r:id="rId17"/>
+    <p:sldId id="301" r:id="rId18"/>
+    <p:sldId id="302" r:id="rId19"/>
+    <p:sldId id="330" r:id="rId20"/>
+    <p:sldId id="419" r:id="rId21"/>
+    <p:sldId id="332" r:id="rId22"/>
+    <p:sldId id="430" r:id="rId23"/>
+    <p:sldId id="406" r:id="rId24"/>
+    <p:sldId id="408" r:id="rId25"/>
+    <p:sldId id="432" r:id="rId26"/>
+    <p:sldId id="431" r:id="rId27"/>
   </p:sldIdLst>
   <p:sldSz cx="12192000" cy="6858000"/>
   <p:notesSz cx="6858000" cy="9144000"/>
@@ -220,7 +222,7 @@
           <a:p>
             <a:fld id="{22668931-3B21-49FF-8F8C-71636D3B6246}" type="datetimeFigureOut">
               <a:rPr lang="en-US" smtClean="0"/>
-              <a:t>12/11/2023</a:t>
+              <a:t>3/24/2025</a:t>
             </a:fld>
             <a:endParaRPr lang="en-US"/>
           </a:p>
@@ -980,7 +982,7 @@
           <a:p>
             <a:fld id="{AD86E2D3-8F12-4CB7-B6F3-018CFC08298B}" type="slidenum">
               <a:rPr lang="en-US" smtClean="0"/>
-              <a:t>10</a:t>
+              <a:t>12</a:t>
             </a:fld>
             <a:endParaRPr lang="en-US"/>
           </a:p>
@@ -1072,7 +1074,7 @@
           <a:p>
             <a:fld id="{AD86E2D3-8F12-4CB7-B6F3-018CFC08298B}" type="slidenum">
               <a:rPr lang="en-US" smtClean="0"/>
-              <a:t>13</a:t>
+              <a:t>15</a:t>
             </a:fld>
             <a:endParaRPr lang="en-US"/>
           </a:p>
@@ -1159,7 +1161,7 @@
           <a:p>
             <a:fld id="{AD86E2D3-8F12-4CB7-B6F3-018CFC08298B}" type="slidenum">
               <a:rPr lang="en-US" smtClean="0"/>
-              <a:t>14</a:t>
+              <a:t>16</a:t>
             </a:fld>
             <a:endParaRPr lang="en-US"/>
           </a:p>
@@ -1287,7 +1289,7 @@
           <a:p>
             <a:fld id="{AD86E2D3-8F12-4CB7-B6F3-018CFC08298B}" type="slidenum">
               <a:rPr lang="en-US" smtClean="0"/>
-              <a:t>16</a:t>
+              <a:t>18</a:t>
             </a:fld>
             <a:endParaRPr lang="en-US"/>
           </a:p>
@@ -1371,7 +1373,7 @@
           <a:p>
             <a:fld id="{AD86E2D3-8F12-4CB7-B6F3-018CFC08298B}" type="slidenum">
               <a:rPr lang="en-US" smtClean="0"/>
-              <a:t>17</a:t>
+              <a:t>19</a:t>
             </a:fld>
             <a:endParaRPr lang="en-US"/>
           </a:p>
@@ -1455,7 +1457,7 @@
           <a:p>
             <a:fld id="{AD86E2D3-8F12-4CB7-B6F3-018CFC08298B}" type="slidenum">
               <a:rPr lang="en-US" smtClean="0"/>
-              <a:t>19</a:t>
+              <a:t>21</a:t>
             </a:fld>
             <a:endParaRPr lang="en-US"/>
           </a:p>
@@ -1539,7 +1541,7 @@
           <a:p>
             <a:fld id="{AD86E2D3-8F12-4CB7-B6F3-018CFC08298B}" type="slidenum">
               <a:rPr lang="en-US" smtClean="0"/>
-              <a:t>20</a:t>
+              <a:t>22</a:t>
             </a:fld>
             <a:endParaRPr lang="en-US"/>
           </a:p>
@@ -1705,7 +1707,7 @@
           <a:p>
             <a:fld id="{375DD456-C247-4442-A401-25876125ED1F}" type="datetimeFigureOut">
               <a:rPr lang="en-US" smtClean="0"/>
-              <a:t>12/11/2023</a:t>
+              <a:t>3/24/2025</a:t>
             </a:fld>
             <a:endParaRPr lang="en-US"/>
           </a:p>
@@ -1903,7 +1905,7 @@
           <a:p>
             <a:fld id="{375DD456-C247-4442-A401-25876125ED1F}" type="datetimeFigureOut">
               <a:rPr lang="en-US" smtClean="0"/>
-              <a:t>12/11/2023</a:t>
+              <a:t>3/24/2025</a:t>
             </a:fld>
             <a:endParaRPr lang="en-US"/>
           </a:p>
@@ -2111,7 +2113,7 @@
           <a:p>
             <a:fld id="{375DD456-C247-4442-A401-25876125ED1F}" type="datetimeFigureOut">
               <a:rPr lang="en-US" smtClean="0"/>
-              <a:t>12/11/2023</a:t>
+              <a:t>3/24/2025</a:t>
             </a:fld>
             <a:endParaRPr lang="en-US"/>
           </a:p>
@@ -2309,7 +2311,7 @@
           <a:p>
             <a:fld id="{375DD456-C247-4442-A401-25876125ED1F}" type="datetimeFigureOut">
               <a:rPr lang="en-US" smtClean="0"/>
-              <a:t>12/11/2023</a:t>
+              <a:t>3/24/2025</a:t>
             </a:fld>
             <a:endParaRPr lang="en-US"/>
           </a:p>
@@ -2584,7 +2586,7 @@
           <a:p>
             <a:fld id="{375DD456-C247-4442-A401-25876125ED1F}" type="datetimeFigureOut">
               <a:rPr lang="en-US" smtClean="0"/>
-              <a:t>12/11/2023</a:t>
+              <a:t>3/24/2025</a:t>
             </a:fld>
             <a:endParaRPr lang="en-US"/>
           </a:p>
@@ -2849,7 +2851,7 @@
           <a:p>
             <a:fld id="{375DD456-C247-4442-A401-25876125ED1F}" type="datetimeFigureOut">
               <a:rPr lang="en-US" smtClean="0"/>
-              <a:t>12/11/2023</a:t>
+              <a:t>3/24/2025</a:t>
             </a:fld>
             <a:endParaRPr lang="en-US"/>
           </a:p>
@@ -3261,7 +3263,7 @@
           <a:p>
             <a:fld id="{375DD456-C247-4442-A401-25876125ED1F}" type="datetimeFigureOut">
               <a:rPr lang="en-US" smtClean="0"/>
-              <a:t>12/11/2023</a:t>
+              <a:t>3/24/2025</a:t>
             </a:fld>
             <a:endParaRPr lang="en-US"/>
           </a:p>
@@ -3402,7 +3404,7 @@
           <a:p>
             <a:fld id="{375DD456-C247-4442-A401-25876125ED1F}" type="datetimeFigureOut">
               <a:rPr lang="en-US" smtClean="0"/>
-              <a:t>12/11/2023</a:t>
+              <a:t>3/24/2025</a:t>
             </a:fld>
             <a:endParaRPr lang="en-US"/>
           </a:p>
@@ -3515,7 +3517,7 @@
           <a:p>
             <a:fld id="{375DD456-C247-4442-A401-25876125ED1F}" type="datetimeFigureOut">
               <a:rPr lang="en-US" smtClean="0"/>
-              <a:t>12/11/2023</a:t>
+              <a:t>3/24/2025</a:t>
             </a:fld>
             <a:endParaRPr lang="en-US"/>
           </a:p>
@@ -3826,7 +3828,7 @@
           <a:p>
             <a:fld id="{375DD456-C247-4442-A401-25876125ED1F}" type="datetimeFigureOut">
               <a:rPr lang="en-US" smtClean="0"/>
-              <a:t>12/11/2023</a:t>
+              <a:t>3/24/2025</a:t>
             </a:fld>
             <a:endParaRPr lang="en-US"/>
           </a:p>
@@ -4114,7 +4116,7 @@
           <a:p>
             <a:fld id="{375DD456-C247-4442-A401-25876125ED1F}" type="datetimeFigureOut">
               <a:rPr lang="en-US" smtClean="0"/>
-              <a:t>12/11/2023</a:t>
+              <a:t>3/24/2025</a:t>
             </a:fld>
             <a:endParaRPr lang="en-US"/>
           </a:p>
@@ -4355,7 +4357,7 @@
           <a:p>
             <a:fld id="{375DD456-C247-4442-A401-25876125ED1F}" type="datetimeFigureOut">
               <a:rPr lang="en-US" smtClean="0"/>
-              <a:t>12/11/2023</a:t>
+              <a:t>3/24/2025</a:t>
             </a:fld>
             <a:endParaRPr lang="en-US"/>
           </a:p>
@@ -4980,6 +4982,511 @@
           <p:cNvPr id="2" name="Title 1">
             <a:extLst>
               <a:ext uri="{FF2B5EF4-FFF2-40B4-BE49-F238E27FC236}">
+                <a16:creationId xmlns:a16="http://schemas.microsoft.com/office/drawing/2014/main" id="{46533804-59EE-4F35-85DF-599B8A141C42}"/>
+              </a:ext>
+            </a:extLst>
+          </p:cNvPr>
+          <p:cNvSpPr>
+            <a:spLocks noGrp="1"/>
+          </p:cNvSpPr>
+          <p:nvPr>
+            <p:ph type="title"/>
+          </p:nvPr>
+        </p:nvSpPr>
+        <p:spPr/>
+        <p:txBody>
+          <a:bodyPr/>
+          <a:lstStyle/>
+          <a:p>
+            <a:r>
+              <a:rPr lang="en-US" dirty="0"/>
+              <a:t>RStudio cont.</a:t>
+            </a:r>
+          </a:p>
+        </p:txBody>
+      </p:sp>
+      <p:sp>
+        <p:nvSpPr>
+          <p:cNvPr id="3" name="Content Placeholder 2">
+            <a:extLst>
+              <a:ext uri="{FF2B5EF4-FFF2-40B4-BE49-F238E27FC236}">
+                <a16:creationId xmlns:a16="http://schemas.microsoft.com/office/drawing/2014/main" id="{0AECD268-A8EB-4A90-8647-C5C867157D26}"/>
+              </a:ext>
+            </a:extLst>
+          </p:cNvPr>
+          <p:cNvSpPr>
+            <a:spLocks noGrp="1"/>
+          </p:cNvSpPr>
+          <p:nvPr>
+            <p:ph idx="1"/>
+          </p:nvPr>
+        </p:nvSpPr>
+        <p:spPr/>
+        <p:txBody>
+          <a:bodyPr/>
+          <a:lstStyle/>
+          <a:p>
+            <a:r>
+              <a:rPr lang="en-US" dirty="0"/>
+              <a:t>Back to RStudio! </a:t>
+            </a:r>
+          </a:p>
+          <a:p>
+            <a:r>
+              <a:rPr lang="en-US" dirty="0"/>
+              <a:t>Let’s make those changes</a:t>
+            </a:r>
+          </a:p>
+          <a:p>
+            <a:endParaRPr lang="en-US" dirty="0"/>
+          </a:p>
+          <a:p>
+            <a:r>
+              <a:rPr lang="en-US" dirty="0"/>
+              <a:t>We’ll also go over:</a:t>
+            </a:r>
+          </a:p>
+          <a:p>
+            <a:pPr lvl="1"/>
+            <a:r>
+              <a:rPr lang="en-US" dirty="0"/>
+              <a:t>Advantages of RStudio projects</a:t>
+            </a:r>
+          </a:p>
+          <a:p>
+            <a:pPr lvl="1"/>
+            <a:r>
+              <a:rPr lang="en-US" dirty="0"/>
+              <a:t>How to open a script</a:t>
+            </a:r>
+          </a:p>
+          <a:p>
+            <a:pPr lvl="1"/>
+            <a:r>
+              <a:rPr lang="en-US" dirty="0"/>
+              <a:t>Highlighting a word</a:t>
+            </a:r>
+          </a:p>
+          <a:p>
+            <a:pPr lvl="1"/>
+            <a:r>
+              <a:rPr lang="en-US" dirty="0"/>
+              <a:t>Changing the theme</a:t>
+            </a:r>
+          </a:p>
+          <a:p>
+            <a:pPr lvl="1"/>
+            <a:r>
+              <a:rPr lang="en-US" dirty="0"/>
+              <a:t>Using the help tab</a:t>
+            </a:r>
+          </a:p>
+          <a:p>
+            <a:endParaRPr lang="en-US" dirty="0"/>
+          </a:p>
+        </p:txBody>
+      </p:sp>
+      <p:sp>
+        <p:nvSpPr>
+          <p:cNvPr id="4" name="Slide Number Placeholder 3">
+            <a:extLst>
+              <a:ext uri="{FF2B5EF4-FFF2-40B4-BE49-F238E27FC236}">
+                <a16:creationId xmlns:a16="http://schemas.microsoft.com/office/drawing/2014/main" id="{8645E207-B641-4C92-B3E8-1D146C119287}"/>
+              </a:ext>
+            </a:extLst>
+          </p:cNvPr>
+          <p:cNvSpPr>
+            <a:spLocks noGrp="1"/>
+          </p:cNvSpPr>
+          <p:nvPr>
+            <p:ph type="sldNum" sz="quarter" idx="12"/>
+          </p:nvPr>
+        </p:nvSpPr>
+        <p:spPr/>
+        <p:txBody>
+          <a:bodyPr/>
+          <a:lstStyle/>
+          <a:p>
+            <a:fld id="{6D95AE55-B5F4-483D-AEFF-E8059F5502F5}" type="slidenum">
+              <a:rPr lang="en-US" smtClean="0"/>
+              <a:t>10</a:t>
+            </a:fld>
+            <a:endParaRPr lang="en-US"/>
+          </a:p>
+        </p:txBody>
+      </p:sp>
+      <p:pic>
+        <p:nvPicPr>
+          <p:cNvPr id="10" name="Picture 9">
+            <a:extLst>
+              <a:ext uri="{FF2B5EF4-FFF2-40B4-BE49-F238E27FC236}">
+                <a16:creationId xmlns:a16="http://schemas.microsoft.com/office/drawing/2014/main" id="{AFED5C39-9275-46AD-AC80-05FB2F857AFC}"/>
+              </a:ext>
+            </a:extLst>
+          </p:cNvPr>
+          <p:cNvPicPr>
+            <a:picLocks noChangeAspect="1"/>
+          </p:cNvPicPr>
+          <p:nvPr/>
+        </p:nvPicPr>
+        <p:blipFill rotWithShape="1">
+          <a:blip r:embed="rId2">
+            <a:extLst>
+              <a:ext uri="{28A0092B-C50C-407E-A947-70E740481C1C}">
+                <a14:useLocalDpi xmlns:a14="http://schemas.microsoft.com/office/drawing/2010/main" val="0"/>
+              </a:ext>
+            </a:extLst>
+          </a:blip>
+          <a:srcRect l="18679" t="9920" r="12866"/>
+          <a:stretch/>
+        </p:blipFill>
+        <p:spPr>
+          <a:xfrm>
+            <a:off x="6096000" y="1309170"/>
+            <a:ext cx="4772025" cy="5363361"/>
+          </a:xfrm>
+          <a:prstGeom prst="rect">
+            <a:avLst/>
+          </a:prstGeom>
+        </p:spPr>
+      </p:pic>
+    </p:spTree>
+    <p:extLst>
+      <p:ext uri="{BB962C8B-B14F-4D97-AF65-F5344CB8AC3E}">
+        <p14:creationId xmlns:p14="http://schemas.microsoft.com/office/powerpoint/2010/main" val="2227453336"/>
+      </p:ext>
+    </p:extLst>
+  </p:cSld>
+  <p:clrMapOvr>
+    <a:masterClrMapping/>
+  </p:clrMapOvr>
+</p:sld>
+</file>
+
+<file path=ppt/slides/slide11.xml><?xml version="1.0" encoding="utf-8"?>
+<p:sld xmlns:a="http://schemas.openxmlformats.org/drawingml/2006/main" xmlns:r="http://schemas.openxmlformats.org/officeDocument/2006/relationships" xmlns:p="http://schemas.openxmlformats.org/presentationml/2006/main">
+  <p:cSld>
+    <p:spTree>
+      <p:nvGrpSpPr>
+        <p:cNvPr id="1" name=""/>
+        <p:cNvGrpSpPr/>
+        <p:nvPr/>
+      </p:nvGrpSpPr>
+      <p:grpSpPr>
+        <a:xfrm>
+          <a:off x="0" y="0"/>
+          <a:ext cx="0" cy="0"/>
+          <a:chOff x="0" y="0"/>
+          <a:chExt cx="0" cy="0"/>
+        </a:xfrm>
+      </p:grpSpPr>
+      <p:sp>
+        <p:nvSpPr>
+          <p:cNvPr id="2" name="Title 1">
+            <a:extLst>
+              <a:ext uri="{FF2B5EF4-FFF2-40B4-BE49-F238E27FC236}">
+                <a16:creationId xmlns:a16="http://schemas.microsoft.com/office/drawing/2014/main" id="{35EF7A99-5336-EFA6-6787-840AF795751B}"/>
+              </a:ext>
+            </a:extLst>
+          </p:cNvPr>
+          <p:cNvSpPr>
+            <a:spLocks noGrp="1"/>
+          </p:cNvSpPr>
+          <p:nvPr>
+            <p:ph type="title"/>
+          </p:nvPr>
+        </p:nvSpPr>
+        <p:spPr>
+          <a:xfrm>
+            <a:off x="838200" y="18255"/>
+            <a:ext cx="10515600" cy="1024481"/>
+          </a:xfrm>
+        </p:spPr>
+        <p:txBody>
+          <a:bodyPr/>
+          <a:lstStyle/>
+          <a:p>
+            <a:r>
+              <a:rPr lang="en-US" dirty="0"/>
+              <a:t>So wait, what does an RStudio Project do?</a:t>
+            </a:r>
+          </a:p>
+        </p:txBody>
+      </p:sp>
+      <p:sp>
+        <p:nvSpPr>
+          <p:cNvPr id="3" name="Content Placeholder 2">
+            <a:extLst>
+              <a:ext uri="{FF2B5EF4-FFF2-40B4-BE49-F238E27FC236}">
+                <a16:creationId xmlns:a16="http://schemas.microsoft.com/office/drawing/2014/main" id="{7BB3CCD0-88BB-E771-86DC-BD9C683E6A6D}"/>
+              </a:ext>
+            </a:extLst>
+          </p:cNvPr>
+          <p:cNvSpPr>
+            <a:spLocks noGrp="1"/>
+          </p:cNvSpPr>
+          <p:nvPr>
+            <p:ph idx="1"/>
+          </p:nvPr>
+        </p:nvSpPr>
+        <p:spPr>
+          <a:xfrm>
+            <a:off x="613317" y="1127522"/>
+            <a:ext cx="11195824" cy="4351338"/>
+          </a:xfrm>
+        </p:spPr>
+        <p:txBody>
+          <a:bodyPr/>
+          <a:lstStyle/>
+          <a:p>
+            <a:pPr marL="0" indent="0">
+              <a:buNone/>
+            </a:pPr>
+            <a:r>
+              <a:rPr lang="en-US" dirty="0"/>
+              <a:t>“Makes it straightforward to divide your work in </a:t>
+            </a:r>
+            <a:r>
+              <a:rPr lang="en-US" b="1" dirty="0"/>
+              <a:t>contexts</a:t>
+            </a:r>
+            <a:r>
+              <a:rPr lang="en-US" dirty="0"/>
+              <a:t>”</a:t>
+            </a:r>
+          </a:p>
+          <a:p>
+            <a:pPr marL="457200" lvl="1" indent="0">
+              <a:buNone/>
+            </a:pPr>
+            <a:r>
+              <a:rPr lang="en-US" i="1" dirty="0"/>
+              <a:t>Each work project can (and probably should) have an RStudio Project</a:t>
+            </a:r>
+          </a:p>
+          <a:p>
+            <a:pPr lvl="1"/>
+            <a:endParaRPr lang="en-US" dirty="0"/>
+          </a:p>
+          <a:p>
+            <a:r>
+              <a:rPr lang="en-US" dirty="0"/>
+              <a:t>Remembers which files are left open (including unsaved ones, somehow)</a:t>
+            </a:r>
+          </a:p>
+          <a:p>
+            <a:r>
+              <a:rPr lang="en-US" dirty="0"/>
+              <a:t>Automatically sets working directory for data import &amp; export</a:t>
+            </a:r>
+          </a:p>
+          <a:p>
+            <a:pPr marL="457200" lvl="1" indent="0">
+              <a:buNone/>
+            </a:pPr>
+            <a:r>
+              <a:rPr lang="en-US" i="1" dirty="0"/>
+              <a:t>This is a bigger deal than it sounds like!  Much easier to</a:t>
+            </a:r>
+          </a:p>
+          <a:p>
+            <a:pPr lvl="2"/>
+            <a:r>
+              <a:rPr lang="en-US" dirty="0"/>
+              <a:t>Share a project with a colleague</a:t>
+            </a:r>
+          </a:p>
+          <a:p>
+            <a:pPr lvl="2"/>
+            <a:r>
+              <a:rPr lang="en-US" dirty="0"/>
+              <a:t>Move a project to another (computer) location</a:t>
+            </a:r>
+          </a:p>
+        </p:txBody>
+      </p:sp>
+      <p:pic>
+        <p:nvPicPr>
+          <p:cNvPr id="7" name="Picture 6">
+            <a:extLst>
+              <a:ext uri="{FF2B5EF4-FFF2-40B4-BE49-F238E27FC236}">
+                <a16:creationId xmlns:a16="http://schemas.microsoft.com/office/drawing/2014/main" id="{66C9201A-95D2-69F8-FB3C-D0010BB5F381}"/>
+              </a:ext>
+            </a:extLst>
+          </p:cNvPr>
+          <p:cNvPicPr>
+            <a:picLocks noChangeAspect="1"/>
+          </p:cNvPicPr>
+          <p:nvPr/>
+        </p:nvPicPr>
+        <p:blipFill>
+          <a:blip r:embed="rId2"/>
+          <a:stretch>
+            <a:fillRect/>
+          </a:stretch>
+        </p:blipFill>
+        <p:spPr>
+          <a:xfrm>
+            <a:off x="7734849" y="4074639"/>
+            <a:ext cx="1672602" cy="1452524"/>
+          </a:xfrm>
+          <a:prstGeom prst="rect">
+            <a:avLst/>
+          </a:prstGeom>
+        </p:spPr>
+      </p:pic>
+      <p:pic>
+        <p:nvPicPr>
+          <p:cNvPr id="9" name="Graphic 8" descr="Open hand outline">
+            <a:extLst>
+              <a:ext uri="{FF2B5EF4-FFF2-40B4-BE49-F238E27FC236}">
+                <a16:creationId xmlns:a16="http://schemas.microsoft.com/office/drawing/2014/main" id="{0DAB6140-99CC-F756-69D9-F0C1D2F20600}"/>
+              </a:ext>
+            </a:extLst>
+          </p:cNvPr>
+          <p:cNvPicPr>
+            <a:picLocks noChangeAspect="1"/>
+          </p:cNvPicPr>
+          <p:nvPr/>
+        </p:nvPicPr>
+        <p:blipFill>
+          <a:blip r:embed="rId3">
+            <a:extLst>
+              <a:ext uri="{96DAC541-7B7A-43D3-8B79-37D633B846F1}">
+                <asvg:svgBlip xmlns:asvg="http://schemas.microsoft.com/office/drawing/2016/SVG/main" r:embed="rId4"/>
+              </a:ext>
+            </a:extLst>
+          </a:blip>
+          <a:stretch>
+            <a:fillRect/>
+          </a:stretch>
+        </p:blipFill>
+        <p:spPr>
+          <a:xfrm rot="654430">
+            <a:off x="7578226" y="4792294"/>
+            <a:ext cx="1469735" cy="1469735"/>
+          </a:xfrm>
+          <a:prstGeom prst="rect">
+            <a:avLst/>
+          </a:prstGeom>
+        </p:spPr>
+      </p:pic>
+      <p:pic>
+        <p:nvPicPr>
+          <p:cNvPr id="11" name="Graphic 10" descr="Sign language outline">
+            <a:extLst>
+              <a:ext uri="{FF2B5EF4-FFF2-40B4-BE49-F238E27FC236}">
+                <a16:creationId xmlns:a16="http://schemas.microsoft.com/office/drawing/2014/main" id="{996D5530-1BBD-D1DC-BB9F-760DD14DF94C}"/>
+              </a:ext>
+            </a:extLst>
+          </p:cNvPr>
+          <p:cNvPicPr>
+            <a:picLocks noChangeAspect="1"/>
+          </p:cNvPicPr>
+          <p:nvPr/>
+        </p:nvPicPr>
+        <p:blipFill>
+          <a:blip r:embed="rId5">
+            <a:extLst>
+              <a:ext uri="{96DAC541-7B7A-43D3-8B79-37D633B846F1}">
+                <asvg:svgBlip xmlns:asvg="http://schemas.microsoft.com/office/drawing/2016/SVG/main" r:embed="rId6"/>
+              </a:ext>
+            </a:extLst>
+          </a:blip>
+          <a:stretch>
+            <a:fillRect/>
+          </a:stretch>
+        </p:blipFill>
+        <p:spPr>
+          <a:xfrm rot="1016096" flipH="1">
+            <a:off x="9652423" y="4978704"/>
+            <a:ext cx="1438507" cy="1462285"/>
+          </a:xfrm>
+          <a:prstGeom prst="rect">
+            <a:avLst/>
+          </a:prstGeom>
+        </p:spPr>
+      </p:pic>
+      <p:sp>
+        <p:nvSpPr>
+          <p:cNvPr id="12" name="Left Brace 11">
+            <a:extLst>
+              <a:ext uri="{FF2B5EF4-FFF2-40B4-BE49-F238E27FC236}">
+                <a16:creationId xmlns:a16="http://schemas.microsoft.com/office/drawing/2014/main" id="{A5D97652-0A07-038A-E5FB-9DA1A0CDA9F1}"/>
+              </a:ext>
+            </a:extLst>
+          </p:cNvPr>
+          <p:cNvSpPr/>
+          <p:nvPr/>
+        </p:nvSpPr>
+        <p:spPr>
+          <a:xfrm>
+            <a:off x="360557" y="2436541"/>
+            <a:ext cx="252760" cy="992459"/>
+          </a:xfrm>
+          <a:prstGeom prst="leftBrace">
+            <a:avLst/>
+          </a:prstGeom>
+          <a:ln w="28575"/>
+        </p:spPr>
+        <p:style>
+          <a:lnRef idx="1">
+            <a:schemeClr val="accent1"/>
+          </a:lnRef>
+          <a:fillRef idx="0">
+            <a:schemeClr val="accent1"/>
+          </a:fillRef>
+          <a:effectRef idx="0">
+            <a:schemeClr val="accent1"/>
+          </a:effectRef>
+          <a:fontRef idx="minor">
+            <a:schemeClr val="tx1"/>
+          </a:fontRef>
+        </p:style>
+        <p:txBody>
+          <a:bodyPr rtlCol="0" anchor="ctr"/>
+          <a:lstStyle/>
+          <a:p>
+            <a:pPr algn="ctr"/>
+            <a:endParaRPr lang="en-US"/>
+          </a:p>
+        </p:txBody>
+      </p:sp>
+    </p:spTree>
+    <p:extLst>
+      <p:ext uri="{BB962C8B-B14F-4D97-AF65-F5344CB8AC3E}">
+        <p14:creationId xmlns:p14="http://schemas.microsoft.com/office/powerpoint/2010/main" val="2076505882"/>
+      </p:ext>
+    </p:extLst>
+  </p:cSld>
+  <p:clrMapOvr>
+    <a:masterClrMapping/>
+  </p:clrMapOvr>
+</p:sld>
+</file>
+
+<file path=ppt/slides/slide12.xml><?xml version="1.0" encoding="utf-8"?>
+<p:sld xmlns:a="http://schemas.openxmlformats.org/drawingml/2006/main" xmlns:r="http://schemas.openxmlformats.org/officeDocument/2006/relationships" xmlns:p="http://schemas.openxmlformats.org/presentationml/2006/main">
+  <p:cSld>
+    <p:spTree>
+      <p:nvGrpSpPr>
+        <p:cNvPr id="1" name=""/>
+        <p:cNvGrpSpPr/>
+        <p:nvPr/>
+      </p:nvGrpSpPr>
+      <p:grpSpPr>
+        <a:xfrm>
+          <a:off x="0" y="0"/>
+          <a:ext cx="0" cy="0"/>
+          <a:chOff x="0" y="0"/>
+          <a:chExt cx="0" cy="0"/>
+        </a:xfrm>
+      </p:grpSpPr>
+      <p:sp>
+        <p:nvSpPr>
+          <p:cNvPr id="2" name="Title 1">
+            <a:extLst>
+              <a:ext uri="{FF2B5EF4-FFF2-40B4-BE49-F238E27FC236}">
                 <a16:creationId xmlns:a16="http://schemas.microsoft.com/office/drawing/2014/main" id="{55B08510-82E4-4502-9977-E5DD89855A18}"/>
               </a:ext>
             </a:extLst>
@@ -5060,7 +5567,15 @@
             </a:pPr>
             <a:r>
               <a:rPr lang="en-US" dirty="0"/>
-              <a:t>Do this by downloading from Software Center and/or running:</a:t>
+              <a:t>Do this by downloading from Software Center </a:t>
+            </a:r>
+            <a:r>
+              <a:rPr lang="en-US" b="1" dirty="0"/>
+              <a:t>and/or </a:t>
+            </a:r>
+            <a:r>
+              <a:rPr lang="en-US" dirty="0"/>
+              <a:t>running:</a:t>
             </a:r>
           </a:p>
           <a:p>
@@ -5152,7 +5667,7 @@
           <a:p>
             <a:fld id="{6D95AE55-B5F4-483D-AEFF-E8059F5502F5}" type="slidenum">
               <a:rPr lang="en-US" smtClean="0"/>
-              <a:t>10</a:t>
+              <a:t>12</a:t>
             </a:fld>
             <a:endParaRPr lang="en-US"/>
           </a:p>
@@ -5611,7 +6126,7 @@
 </p:sld>
 </file>
 
-<file path=ppt/slides/slide11.xml><?xml version="1.0" encoding="utf-8"?>
+<file path=ppt/slides/slide13.xml><?xml version="1.0" encoding="utf-8"?>
 <p:sld xmlns:a="http://schemas.openxmlformats.org/drawingml/2006/main" xmlns:r="http://schemas.openxmlformats.org/officeDocument/2006/relationships" xmlns:p="http://schemas.openxmlformats.org/presentationml/2006/main">
   <p:cSld>
     <p:spTree>
@@ -6047,7 +6562,7 @@
           <a:p>
             <a:fld id="{6D95AE55-B5F4-483D-AEFF-E8059F5502F5}" type="slidenum">
               <a:rPr lang="en-US" smtClean="0"/>
-              <a:t>11</a:t>
+              <a:t>13</a:t>
             </a:fld>
             <a:endParaRPr lang="en-US"/>
           </a:p>
@@ -6066,7 +6581,7 @@
 </p:sld>
 </file>
 
-<file path=ppt/slides/slide12.xml><?xml version="1.0" encoding="utf-8"?>
+<file path=ppt/slides/slide14.xml><?xml version="1.0" encoding="utf-8"?>
 <p:sld xmlns:a="http://schemas.openxmlformats.org/drawingml/2006/main" xmlns:r="http://schemas.openxmlformats.org/officeDocument/2006/relationships" xmlns:p="http://schemas.openxmlformats.org/presentationml/2006/main">
   <p:cSld>
     <p:spTree>
@@ -6502,7 +7017,7 @@
           <a:p>
             <a:fld id="{6D95AE55-B5F4-483D-AEFF-E8059F5502F5}" type="slidenum">
               <a:rPr lang="en-US" smtClean="0"/>
-              <a:t>12</a:t>
+              <a:t>14</a:t>
             </a:fld>
             <a:endParaRPr lang="en-US"/>
           </a:p>
@@ -6677,416 +7192,6 @@
 </p:sld>
 </file>
 
-<file path=ppt/slides/slide13.xml><?xml version="1.0" encoding="utf-8"?>
-<p:sld xmlns:a="http://schemas.openxmlformats.org/drawingml/2006/main" xmlns:r="http://schemas.openxmlformats.org/officeDocument/2006/relationships" xmlns:p="http://schemas.openxmlformats.org/presentationml/2006/main">
-  <p:cSld>
-    <p:spTree>
-      <p:nvGrpSpPr>
-        <p:cNvPr id="1" name=""/>
-        <p:cNvGrpSpPr/>
-        <p:nvPr/>
-      </p:nvGrpSpPr>
-      <p:grpSpPr>
-        <a:xfrm>
-          <a:off x="0" y="0"/>
-          <a:ext cx="0" cy="0"/>
-          <a:chOff x="0" y="0"/>
-          <a:chExt cx="0" cy="0"/>
-        </a:xfrm>
-      </p:grpSpPr>
-      <p:sp>
-        <p:nvSpPr>
-          <p:cNvPr id="2" name="Title 1">
-            <a:extLst>
-              <a:ext uri="{FF2B5EF4-FFF2-40B4-BE49-F238E27FC236}">
-                <a16:creationId xmlns:a16="http://schemas.microsoft.com/office/drawing/2014/main" id="{995DB329-B982-43C6-8BE4-522B21D7902A}"/>
-              </a:ext>
-            </a:extLst>
-          </p:cNvPr>
-          <p:cNvSpPr>
-            <a:spLocks noGrp="1"/>
-          </p:cNvSpPr>
-          <p:nvPr>
-            <p:ph type="title"/>
-          </p:nvPr>
-        </p:nvSpPr>
-        <p:spPr/>
-        <p:txBody>
-          <a:bodyPr/>
-          <a:lstStyle/>
-          <a:p>
-            <a:r>
-              <a:rPr lang="en-US" dirty="0"/>
-              <a:t>Jargon</a:t>
-            </a:r>
-          </a:p>
-        </p:txBody>
-      </p:sp>
-      <p:sp>
-        <p:nvSpPr>
-          <p:cNvPr id="3" name="Content Placeholder 2">
-            <a:extLst>
-              <a:ext uri="{FF2B5EF4-FFF2-40B4-BE49-F238E27FC236}">
-                <a16:creationId xmlns:a16="http://schemas.microsoft.com/office/drawing/2014/main" id="{8337819F-B243-4B43-836F-81B6B5CCED77}"/>
-              </a:ext>
-            </a:extLst>
-          </p:cNvPr>
-          <p:cNvSpPr>
-            <a:spLocks noGrp="1"/>
-          </p:cNvSpPr>
-          <p:nvPr>
-            <p:ph idx="1"/>
-          </p:nvPr>
-        </p:nvSpPr>
-        <p:spPr>
-          <a:xfrm>
-            <a:off x="419100" y="1825625"/>
-            <a:ext cx="11353800" cy="4351338"/>
-          </a:xfrm>
-        </p:spPr>
-        <p:txBody>
-          <a:bodyPr>
-            <a:normAutofit/>
-          </a:bodyPr>
-          <a:lstStyle/>
-          <a:p>
-            <a:pPr marL="1828800" indent="-1828800">
-              <a:spcBef>
-                <a:spcPts val="1800"/>
-              </a:spcBef>
-              <a:buNone/>
-            </a:pPr>
-            <a:r>
-              <a:rPr lang="en-US" b="1" i="1" dirty="0"/>
-              <a:t>Function</a:t>
-            </a:r>
-            <a:r>
-              <a:rPr lang="en-US" dirty="0"/>
-              <a:t>       A set of commands that evaluates your data in a specific way. You can write your own functions, or they can be provided via other packages or from “Base R“.</a:t>
-            </a:r>
-          </a:p>
-          <a:p>
-            <a:pPr marL="1828800" indent="-1828800">
-              <a:spcBef>
-                <a:spcPts val="1800"/>
-              </a:spcBef>
-              <a:buNone/>
-            </a:pPr>
-            <a:r>
-              <a:rPr lang="en-US" b="1" i="1" dirty="0"/>
-              <a:t>Argument</a:t>
-            </a:r>
-            <a:r>
-              <a:rPr lang="en-US" dirty="0"/>
-              <a:t>    In a function, this is a possible input.				                    </a:t>
-            </a:r>
-            <a:r>
-              <a:rPr lang="en-US" sz="2400" dirty="0"/>
-              <a:t>For example:  </a:t>
-            </a:r>
-            <a:r>
-              <a:rPr lang="en-US" sz="2000" dirty="0">
-                <a:latin typeface="Consolas" panose="020B0609020204030204" pitchFamily="49" charset="0"/>
-              </a:rPr>
-              <a:t>mean(data, </a:t>
-            </a:r>
-            <a:r>
-              <a:rPr lang="en-US" sz="2000" b="1" dirty="0">
-                <a:solidFill>
-                  <a:srgbClr val="FF0000"/>
-                </a:solidFill>
-                <a:latin typeface="Consolas" panose="020B0609020204030204" pitchFamily="49" charset="0"/>
-              </a:rPr>
-              <a:t>na.rm = TRUE</a:t>
-            </a:r>
-            <a:r>
-              <a:rPr lang="en-US" sz="2000" dirty="0">
-                <a:latin typeface="Consolas" panose="020B0609020204030204" pitchFamily="49" charset="0"/>
-              </a:rPr>
-              <a:t>)</a:t>
-            </a:r>
-            <a:r>
-              <a:rPr lang="en-US" sz="2400" dirty="0"/>
-              <a:t> uses an argument to remove NAs</a:t>
-            </a:r>
-          </a:p>
-          <a:p>
-            <a:pPr marL="1828800" indent="-1828800">
-              <a:spcBef>
-                <a:spcPts val="1800"/>
-              </a:spcBef>
-              <a:buNone/>
-            </a:pPr>
-            <a:r>
-              <a:rPr lang="en-US" b="1" i="1" dirty="0"/>
-              <a:t>Package</a:t>
-            </a:r>
-            <a:r>
-              <a:rPr lang="en-US" dirty="0"/>
-              <a:t>       A group of new commands / functions  to extend the functionality of Base R.</a:t>
-            </a:r>
-          </a:p>
-          <a:p>
-            <a:pPr marL="1828800" indent="-1828800">
-              <a:spcBef>
-                <a:spcPts val="1800"/>
-              </a:spcBef>
-              <a:buNone/>
-            </a:pPr>
-            <a:r>
-              <a:rPr lang="en-US" b="1" i="1" dirty="0"/>
-              <a:t>Variable</a:t>
-            </a:r>
-            <a:r>
-              <a:rPr lang="en-US" dirty="0"/>
-              <a:t>       Something saved in R’s memory for use later. </a:t>
-            </a:r>
-          </a:p>
-          <a:p>
-            <a:endParaRPr lang="en-US" dirty="0"/>
-          </a:p>
-        </p:txBody>
-      </p:sp>
-      <p:sp>
-        <p:nvSpPr>
-          <p:cNvPr id="4" name="Slide Number Placeholder 3">
-            <a:extLst>
-              <a:ext uri="{FF2B5EF4-FFF2-40B4-BE49-F238E27FC236}">
-                <a16:creationId xmlns:a16="http://schemas.microsoft.com/office/drawing/2014/main" id="{E1E509DD-AFCF-4BAB-8214-28D53C3776A7}"/>
-              </a:ext>
-            </a:extLst>
-          </p:cNvPr>
-          <p:cNvSpPr>
-            <a:spLocks noGrp="1"/>
-          </p:cNvSpPr>
-          <p:nvPr>
-            <p:ph type="sldNum" sz="quarter" idx="12"/>
-          </p:nvPr>
-        </p:nvSpPr>
-        <p:spPr/>
-        <p:txBody>
-          <a:bodyPr/>
-          <a:lstStyle/>
-          <a:p>
-            <a:fld id="{6D95AE55-B5F4-483D-AEFF-E8059F5502F5}" type="slidenum">
-              <a:rPr lang="en-US" smtClean="0"/>
-              <a:t>13</a:t>
-            </a:fld>
-            <a:endParaRPr lang="en-US"/>
-          </a:p>
-        </p:txBody>
-      </p:sp>
-    </p:spTree>
-    <p:extLst>
-      <p:ext uri="{BB962C8B-B14F-4D97-AF65-F5344CB8AC3E}">
-        <p14:creationId xmlns:p14="http://schemas.microsoft.com/office/powerpoint/2010/main" val="207110796"/>
-      </p:ext>
-    </p:extLst>
-  </p:cSld>
-  <p:clrMapOvr>
-    <a:masterClrMapping/>
-  </p:clrMapOvr>
-</p:sld>
-</file>
-
-<file path=ppt/slides/slide14.xml><?xml version="1.0" encoding="utf-8"?>
-<p:sld xmlns:a="http://schemas.openxmlformats.org/drawingml/2006/main" xmlns:r="http://schemas.openxmlformats.org/officeDocument/2006/relationships" xmlns:p="http://schemas.openxmlformats.org/presentationml/2006/main">
-  <p:cSld>
-    <p:spTree>
-      <p:nvGrpSpPr>
-        <p:cNvPr id="1" name=""/>
-        <p:cNvGrpSpPr/>
-        <p:nvPr/>
-      </p:nvGrpSpPr>
-      <p:grpSpPr>
-        <a:xfrm>
-          <a:off x="0" y="0"/>
-          <a:ext cx="0" cy="0"/>
-          <a:chOff x="0" y="0"/>
-          <a:chExt cx="0" cy="0"/>
-        </a:xfrm>
-      </p:grpSpPr>
-      <p:sp>
-        <p:nvSpPr>
-          <p:cNvPr id="2" name="Title 1">
-            <a:extLst>
-              <a:ext uri="{FF2B5EF4-FFF2-40B4-BE49-F238E27FC236}">
-                <a16:creationId xmlns:a16="http://schemas.microsoft.com/office/drawing/2014/main" id="{3F190CCF-CAFA-40FE-9C89-FCF51AB47631}"/>
-              </a:ext>
-            </a:extLst>
-          </p:cNvPr>
-          <p:cNvSpPr>
-            <a:spLocks noGrp="1"/>
-          </p:cNvSpPr>
-          <p:nvPr>
-            <p:ph type="title"/>
-          </p:nvPr>
-        </p:nvSpPr>
-        <p:spPr/>
-        <p:txBody>
-          <a:bodyPr/>
-          <a:lstStyle/>
-          <a:p>
-            <a:r>
-              <a:rPr lang="en-US" dirty="0"/>
-              <a:t>Jargon cont.</a:t>
-            </a:r>
-          </a:p>
-        </p:txBody>
-      </p:sp>
-      <p:sp>
-        <p:nvSpPr>
-          <p:cNvPr id="3" name="Content Placeholder 2">
-            <a:extLst>
-              <a:ext uri="{FF2B5EF4-FFF2-40B4-BE49-F238E27FC236}">
-                <a16:creationId xmlns:a16="http://schemas.microsoft.com/office/drawing/2014/main" id="{026CA2B0-D4BF-4E76-9213-ABB75DF4A35F}"/>
-              </a:ext>
-            </a:extLst>
-          </p:cNvPr>
-          <p:cNvSpPr>
-            <a:spLocks noGrp="1"/>
-          </p:cNvSpPr>
-          <p:nvPr>
-            <p:ph idx="1"/>
-          </p:nvPr>
-        </p:nvSpPr>
-        <p:spPr>
-          <a:xfrm>
-            <a:off x="558800" y="1825624"/>
-            <a:ext cx="11290300" cy="4895851"/>
-          </a:xfrm>
-        </p:spPr>
-        <p:txBody>
-          <a:bodyPr>
-            <a:normAutofit/>
-          </a:bodyPr>
-          <a:lstStyle/>
-          <a:p>
-            <a:pPr marL="1778000" indent="-1778000" defTabSz="800100">
-              <a:spcBef>
-                <a:spcPts val="1800"/>
-              </a:spcBef>
-              <a:buNone/>
-            </a:pPr>
-            <a:r>
-              <a:rPr lang="en-US" b="1" i="1" dirty="0"/>
-              <a:t>Dataframe </a:t>
-            </a:r>
-            <a:r>
-              <a:rPr lang="en-US" dirty="0"/>
-              <a:t>  A group of rows and columns (like a spreadsheet). Each column has a specific type (TRUE/FALSE, integer, number, character, factor, etc.). </a:t>
-            </a:r>
-          </a:p>
-          <a:p>
-            <a:pPr marL="1778000" indent="-1778000">
-              <a:spcBef>
-                <a:spcPts val="1800"/>
-              </a:spcBef>
-              <a:buNone/>
-            </a:pPr>
-            <a:r>
-              <a:rPr lang="en-US" b="1" i="1" dirty="0"/>
-              <a:t>Factor </a:t>
-            </a:r>
-            <a:r>
-              <a:rPr lang="en-US" dirty="0"/>
-              <a:t>          A type of variable that is a categorical grouping (“red” vs “blue”; “Treatment1” vs “Treatment2” vs “Treatment3”). </a:t>
-            </a:r>
-          </a:p>
-          <a:p>
-            <a:pPr marL="1778000" indent="-1778000">
-              <a:spcBef>
-                <a:spcPts val="1800"/>
-              </a:spcBef>
-              <a:buNone/>
-            </a:pPr>
-            <a:r>
-              <a:rPr lang="en-US" b="1" dirty="0"/>
-              <a:t>&lt;-</a:t>
-            </a:r>
-            <a:r>
-              <a:rPr lang="en-US" dirty="0"/>
-              <a:t>                    The “leftward arrow” assigns the information on the right to the variable on the left. For example:   </a:t>
-            </a:r>
-            <a:r>
-              <a:rPr lang="en-US" sz="2200" dirty="0">
-                <a:latin typeface="Consolas" panose="020B0609020204030204" pitchFamily="49" charset="0"/>
-              </a:rPr>
-              <a:t>x1 &lt;- 42</a:t>
-            </a:r>
-            <a:endParaRPr lang="en-US" dirty="0">
-              <a:latin typeface="Consolas" panose="020B0609020204030204" pitchFamily="49" charset="0"/>
-            </a:endParaRPr>
-          </a:p>
-          <a:p>
-            <a:pPr marL="1778000" indent="-1778000">
-              <a:spcBef>
-                <a:spcPts val="1800"/>
-              </a:spcBef>
-              <a:buNone/>
-            </a:pPr>
-            <a:r>
-              <a:rPr lang="en-US" b="1" dirty="0"/>
-              <a:t>c()</a:t>
-            </a:r>
-            <a:r>
-              <a:rPr lang="en-US" dirty="0"/>
-              <a:t>                   Lowercase c means concatenate which groups a bunch of things together. For example:   </a:t>
-            </a:r>
-            <a:r>
-              <a:rPr lang="en-US" sz="2200" dirty="0">
-                <a:latin typeface="Consolas" panose="020B0609020204030204" pitchFamily="49" charset="0"/>
-              </a:rPr>
-              <a:t>x1 &lt;- c(“duck”, “duck”, “duck”, “goose!”)</a:t>
-            </a:r>
-            <a:endParaRPr lang="en-US" dirty="0">
-              <a:latin typeface="Consolas" panose="020B0609020204030204" pitchFamily="49" charset="0"/>
-            </a:endParaRPr>
-          </a:p>
-        </p:txBody>
-      </p:sp>
-      <p:sp>
-        <p:nvSpPr>
-          <p:cNvPr id="4" name="Slide Number Placeholder 3">
-            <a:extLst>
-              <a:ext uri="{FF2B5EF4-FFF2-40B4-BE49-F238E27FC236}">
-                <a16:creationId xmlns:a16="http://schemas.microsoft.com/office/drawing/2014/main" id="{24782D2D-FB1B-4DF1-8910-A8428578CF71}"/>
-              </a:ext>
-            </a:extLst>
-          </p:cNvPr>
-          <p:cNvSpPr>
-            <a:spLocks noGrp="1"/>
-          </p:cNvSpPr>
-          <p:nvPr>
-            <p:ph type="sldNum" sz="quarter" idx="12"/>
-          </p:nvPr>
-        </p:nvSpPr>
-        <p:spPr/>
-        <p:txBody>
-          <a:bodyPr/>
-          <a:lstStyle/>
-          <a:p>
-            <a:fld id="{6D95AE55-B5F4-483D-AEFF-E8059F5502F5}" type="slidenum">
-              <a:rPr lang="en-US" smtClean="0"/>
-              <a:t>14</a:t>
-            </a:fld>
-            <a:endParaRPr lang="en-US"/>
-          </a:p>
-        </p:txBody>
-      </p:sp>
-    </p:spTree>
-    <p:extLst>
-      <p:ext uri="{BB962C8B-B14F-4D97-AF65-F5344CB8AC3E}">
-        <p14:creationId xmlns:p14="http://schemas.microsoft.com/office/powerpoint/2010/main" val="108486466"/>
-      </p:ext>
-    </p:extLst>
-  </p:cSld>
-  <p:clrMapOvr>
-    <a:masterClrMapping/>
-  </p:clrMapOvr>
-</p:sld>
-</file>
-
 <file path=ppt/slides/slide15.xml><?xml version="1.0" encoding="utf-8"?>
 <p:sld xmlns:a="http://schemas.openxmlformats.org/drawingml/2006/main" xmlns:r="http://schemas.openxmlformats.org/officeDocument/2006/relationships" xmlns:p="http://schemas.openxmlformats.org/presentationml/2006/main">
   <p:cSld>
@@ -7109,7 +7214,7 @@
           <p:cNvPr id="2" name="Title 1">
             <a:extLst>
               <a:ext uri="{FF2B5EF4-FFF2-40B4-BE49-F238E27FC236}">
-                <a16:creationId xmlns:a16="http://schemas.microsoft.com/office/drawing/2014/main" id="{2A253EEA-2FB8-47D2-98DD-D66E81F80E86}"/>
+                <a16:creationId xmlns:a16="http://schemas.microsoft.com/office/drawing/2014/main" id="{995DB329-B982-43C6-8BE4-522B21D7902A}"/>
               </a:ext>
             </a:extLst>
           </p:cNvPr>
@@ -7127,17 +7232,142 @@
           <a:p>
             <a:r>
               <a:rPr lang="en-US" dirty="0"/>
-              <a:t>Some special characters</a:t>
+              <a:t>Jargon</a:t>
             </a:r>
           </a:p>
         </p:txBody>
       </p:sp>
       <p:sp>
         <p:nvSpPr>
+          <p:cNvPr id="3" name="Content Placeholder 2">
+            <a:extLst>
+              <a:ext uri="{FF2B5EF4-FFF2-40B4-BE49-F238E27FC236}">
+                <a16:creationId xmlns:a16="http://schemas.microsoft.com/office/drawing/2014/main" id="{8337819F-B243-4B43-836F-81B6B5CCED77}"/>
+              </a:ext>
+            </a:extLst>
+          </p:cNvPr>
+          <p:cNvSpPr>
+            <a:spLocks noGrp="1"/>
+          </p:cNvSpPr>
+          <p:nvPr>
+            <p:ph idx="1"/>
+          </p:nvPr>
+        </p:nvSpPr>
+        <p:spPr>
+          <a:xfrm>
+            <a:off x="419100" y="1825625"/>
+            <a:ext cx="11353800" cy="4351338"/>
+          </a:xfrm>
+        </p:spPr>
+        <p:txBody>
+          <a:bodyPr>
+            <a:normAutofit/>
+          </a:bodyPr>
+          <a:lstStyle/>
+          <a:p>
+            <a:pPr marL="1828800" indent="-1828800">
+              <a:spcBef>
+                <a:spcPts val="1800"/>
+              </a:spcBef>
+              <a:buNone/>
+            </a:pPr>
+            <a:r>
+              <a:rPr lang="en-US" b="1" i="1" dirty="0"/>
+              <a:t>Function</a:t>
+            </a:r>
+            <a:r>
+              <a:rPr lang="en-US" dirty="0"/>
+              <a:t>       A set of commands that evaluates your data in a specific way. You can write your own functions, or they can be provided via other packages or from “Base R“.</a:t>
+            </a:r>
+          </a:p>
+          <a:p>
+            <a:pPr marL="1828800" indent="-1828800">
+              <a:spcBef>
+                <a:spcPts val="1800"/>
+              </a:spcBef>
+              <a:buNone/>
+            </a:pPr>
+            <a:r>
+              <a:rPr lang="en-US" b="1" i="1" dirty="0"/>
+              <a:t>Argument</a:t>
+            </a:r>
+            <a:r>
+              <a:rPr lang="en-US" dirty="0"/>
+              <a:t>    In a function, this is a possible input.				                    </a:t>
+            </a:r>
+            <a:r>
+              <a:rPr lang="en-US" sz="2400" dirty="0"/>
+              <a:t>For example:  </a:t>
+            </a:r>
+            <a:r>
+              <a:rPr lang="en-US" sz="2000" dirty="0">
+                <a:latin typeface="Consolas" panose="020B0609020204030204" pitchFamily="49" charset="0"/>
+              </a:rPr>
+              <a:t>mean(data, </a:t>
+            </a:r>
+            <a:r>
+              <a:rPr lang="en-US" sz="2000" b="1" dirty="0">
+                <a:solidFill>
+                  <a:srgbClr val="FF0000"/>
+                </a:solidFill>
+                <a:latin typeface="Consolas" panose="020B0609020204030204" pitchFamily="49" charset="0"/>
+              </a:rPr>
+              <a:t>na.rm = TRUE</a:t>
+            </a:r>
+            <a:r>
+              <a:rPr lang="en-US" sz="2000" dirty="0">
+                <a:latin typeface="Consolas" panose="020B0609020204030204" pitchFamily="49" charset="0"/>
+              </a:rPr>
+              <a:t>)</a:t>
+            </a:r>
+            <a:r>
+              <a:rPr lang="en-US" sz="2400" dirty="0"/>
+              <a:t> uses an argument to remove NAs</a:t>
+            </a:r>
+          </a:p>
+          <a:p>
+            <a:pPr marL="1828800" indent="-1828800">
+              <a:spcBef>
+                <a:spcPts val="1800"/>
+              </a:spcBef>
+              <a:buNone/>
+            </a:pPr>
+            <a:r>
+              <a:rPr lang="en-US" b="1" i="1" dirty="0"/>
+              <a:t>Package</a:t>
+            </a:r>
+            <a:r>
+              <a:rPr lang="en-US" dirty="0"/>
+              <a:t>       A group of new commands / functions  to extend the functionality of Base R.</a:t>
+            </a:r>
+          </a:p>
+          <a:p>
+            <a:pPr marL="1828800" indent="-1828800">
+              <a:spcBef>
+                <a:spcPts val="1800"/>
+              </a:spcBef>
+              <a:buNone/>
+            </a:pPr>
+            <a:r>
+              <a:rPr lang="en-US" b="1" i="1" dirty="0"/>
+              <a:t>Variable</a:t>
+            </a:r>
+            <a:r>
+              <a:rPr lang="en-US" dirty="0"/>
+              <a:t>       Something saved in R’s memory for use later. </a:t>
+            </a:r>
+          </a:p>
+          <a:p>
+            <a:endParaRPr lang="en-US" dirty="0"/>
+          </a:p>
+        </p:txBody>
+      </p:sp>
+      <p:sp>
+        <p:nvSpPr>
           <p:cNvPr id="4" name="Slide Number Placeholder 3">
             <a:extLst>
               <a:ext uri="{FF2B5EF4-FFF2-40B4-BE49-F238E27FC236}">
-                <a16:creationId xmlns:a16="http://schemas.microsoft.com/office/drawing/2014/main" id="{84D106F0-A900-400C-9E7C-627857C675AB}"/>
+                <a16:creationId xmlns:a16="http://schemas.microsoft.com/office/drawing/2014/main" id="{E1E509DD-AFCF-4BAB-8214-28D53C3776A7}"/>
               </a:ext>
             </a:extLst>
           </p:cNvPr>
@@ -7156,6 +7386,291 @@
             <a:fld id="{6D95AE55-B5F4-483D-AEFF-E8059F5502F5}" type="slidenum">
               <a:rPr lang="en-US" smtClean="0"/>
               <a:t>15</a:t>
+            </a:fld>
+            <a:endParaRPr lang="en-US"/>
+          </a:p>
+        </p:txBody>
+      </p:sp>
+    </p:spTree>
+    <p:extLst>
+      <p:ext uri="{BB962C8B-B14F-4D97-AF65-F5344CB8AC3E}">
+        <p14:creationId xmlns:p14="http://schemas.microsoft.com/office/powerpoint/2010/main" val="207110796"/>
+      </p:ext>
+    </p:extLst>
+  </p:cSld>
+  <p:clrMapOvr>
+    <a:masterClrMapping/>
+  </p:clrMapOvr>
+</p:sld>
+</file>
+
+<file path=ppt/slides/slide16.xml><?xml version="1.0" encoding="utf-8"?>
+<p:sld xmlns:a="http://schemas.openxmlformats.org/drawingml/2006/main" xmlns:r="http://schemas.openxmlformats.org/officeDocument/2006/relationships" xmlns:p="http://schemas.openxmlformats.org/presentationml/2006/main">
+  <p:cSld>
+    <p:spTree>
+      <p:nvGrpSpPr>
+        <p:cNvPr id="1" name=""/>
+        <p:cNvGrpSpPr/>
+        <p:nvPr/>
+      </p:nvGrpSpPr>
+      <p:grpSpPr>
+        <a:xfrm>
+          <a:off x="0" y="0"/>
+          <a:ext cx="0" cy="0"/>
+          <a:chOff x="0" y="0"/>
+          <a:chExt cx="0" cy="0"/>
+        </a:xfrm>
+      </p:grpSpPr>
+      <p:sp>
+        <p:nvSpPr>
+          <p:cNvPr id="2" name="Title 1">
+            <a:extLst>
+              <a:ext uri="{FF2B5EF4-FFF2-40B4-BE49-F238E27FC236}">
+                <a16:creationId xmlns:a16="http://schemas.microsoft.com/office/drawing/2014/main" id="{3F190CCF-CAFA-40FE-9C89-FCF51AB47631}"/>
+              </a:ext>
+            </a:extLst>
+          </p:cNvPr>
+          <p:cNvSpPr>
+            <a:spLocks noGrp="1"/>
+          </p:cNvSpPr>
+          <p:nvPr>
+            <p:ph type="title"/>
+          </p:nvPr>
+        </p:nvSpPr>
+        <p:spPr/>
+        <p:txBody>
+          <a:bodyPr/>
+          <a:lstStyle/>
+          <a:p>
+            <a:r>
+              <a:rPr lang="en-US" dirty="0"/>
+              <a:t>Jargon cont.</a:t>
+            </a:r>
+          </a:p>
+        </p:txBody>
+      </p:sp>
+      <p:sp>
+        <p:nvSpPr>
+          <p:cNvPr id="3" name="Content Placeholder 2">
+            <a:extLst>
+              <a:ext uri="{FF2B5EF4-FFF2-40B4-BE49-F238E27FC236}">
+                <a16:creationId xmlns:a16="http://schemas.microsoft.com/office/drawing/2014/main" id="{026CA2B0-D4BF-4E76-9213-ABB75DF4A35F}"/>
+              </a:ext>
+            </a:extLst>
+          </p:cNvPr>
+          <p:cNvSpPr>
+            <a:spLocks noGrp="1"/>
+          </p:cNvSpPr>
+          <p:nvPr>
+            <p:ph idx="1"/>
+          </p:nvPr>
+        </p:nvSpPr>
+        <p:spPr>
+          <a:xfrm>
+            <a:off x="558800" y="1825624"/>
+            <a:ext cx="11290300" cy="4895851"/>
+          </a:xfrm>
+        </p:spPr>
+        <p:txBody>
+          <a:bodyPr>
+            <a:normAutofit/>
+          </a:bodyPr>
+          <a:lstStyle/>
+          <a:p>
+            <a:pPr marL="1778000" indent="-1778000" defTabSz="800100">
+              <a:spcBef>
+                <a:spcPts val="1800"/>
+              </a:spcBef>
+              <a:buNone/>
+            </a:pPr>
+            <a:r>
+              <a:rPr lang="en-US" b="1" i="1" dirty="0"/>
+              <a:t>Dataframe </a:t>
+            </a:r>
+            <a:r>
+              <a:rPr lang="en-US" dirty="0"/>
+              <a:t>  A group of rows and columns (like a spreadsheet). Each column has a specific type (TRUE/FALSE, integer, number, character, factor, etc.). </a:t>
+            </a:r>
+          </a:p>
+          <a:p>
+            <a:pPr marL="1778000" indent="-1778000">
+              <a:spcBef>
+                <a:spcPts val="1800"/>
+              </a:spcBef>
+              <a:buNone/>
+            </a:pPr>
+            <a:r>
+              <a:rPr lang="en-US" b="1" i="1" dirty="0"/>
+              <a:t>Factor </a:t>
+            </a:r>
+            <a:r>
+              <a:rPr lang="en-US" dirty="0"/>
+              <a:t>          A type of variable that is a categorical grouping (“red” vs “blue”; “Treatment1” vs “Treatment2” vs “Treatment3”). </a:t>
+            </a:r>
+          </a:p>
+          <a:p>
+            <a:pPr marL="1778000" indent="-1778000">
+              <a:spcBef>
+                <a:spcPts val="1800"/>
+              </a:spcBef>
+              <a:buNone/>
+            </a:pPr>
+            <a:r>
+              <a:rPr lang="en-US" b="1" dirty="0"/>
+              <a:t>&lt;-</a:t>
+            </a:r>
+            <a:r>
+              <a:rPr lang="en-US" dirty="0"/>
+              <a:t>                    The “leftward arrow” assigns the information on the right to the variable on the left. For example:   </a:t>
+            </a:r>
+            <a:r>
+              <a:rPr lang="en-US" sz="2200" dirty="0">
+                <a:latin typeface="Consolas" panose="020B0609020204030204" pitchFamily="49" charset="0"/>
+              </a:rPr>
+              <a:t>x1 &lt;- 42</a:t>
+            </a:r>
+            <a:endParaRPr lang="en-US" dirty="0">
+              <a:latin typeface="Consolas" panose="020B0609020204030204" pitchFamily="49" charset="0"/>
+            </a:endParaRPr>
+          </a:p>
+          <a:p>
+            <a:pPr marL="1778000" indent="-1778000">
+              <a:spcBef>
+                <a:spcPts val="1800"/>
+              </a:spcBef>
+              <a:buNone/>
+            </a:pPr>
+            <a:r>
+              <a:rPr lang="en-US" b="1" dirty="0"/>
+              <a:t>c()</a:t>
+            </a:r>
+            <a:r>
+              <a:rPr lang="en-US" dirty="0"/>
+              <a:t>                   Lowercase c means concatenate which groups a bunch of things together. For example:   </a:t>
+            </a:r>
+            <a:r>
+              <a:rPr lang="en-US" sz="2200" dirty="0">
+                <a:latin typeface="Consolas" panose="020B0609020204030204" pitchFamily="49" charset="0"/>
+              </a:rPr>
+              <a:t>x1 &lt;- c(“duck”, “duck”, “duck”, “goose!”)</a:t>
+            </a:r>
+            <a:endParaRPr lang="en-US" dirty="0">
+              <a:latin typeface="Consolas" panose="020B0609020204030204" pitchFamily="49" charset="0"/>
+            </a:endParaRPr>
+          </a:p>
+        </p:txBody>
+      </p:sp>
+      <p:sp>
+        <p:nvSpPr>
+          <p:cNvPr id="4" name="Slide Number Placeholder 3">
+            <a:extLst>
+              <a:ext uri="{FF2B5EF4-FFF2-40B4-BE49-F238E27FC236}">
+                <a16:creationId xmlns:a16="http://schemas.microsoft.com/office/drawing/2014/main" id="{24782D2D-FB1B-4DF1-8910-A8428578CF71}"/>
+              </a:ext>
+            </a:extLst>
+          </p:cNvPr>
+          <p:cNvSpPr>
+            <a:spLocks noGrp="1"/>
+          </p:cNvSpPr>
+          <p:nvPr>
+            <p:ph type="sldNum" sz="quarter" idx="12"/>
+          </p:nvPr>
+        </p:nvSpPr>
+        <p:spPr/>
+        <p:txBody>
+          <a:bodyPr/>
+          <a:lstStyle/>
+          <a:p>
+            <a:fld id="{6D95AE55-B5F4-483D-AEFF-E8059F5502F5}" type="slidenum">
+              <a:rPr lang="en-US" smtClean="0"/>
+              <a:t>16</a:t>
+            </a:fld>
+            <a:endParaRPr lang="en-US"/>
+          </a:p>
+        </p:txBody>
+      </p:sp>
+    </p:spTree>
+    <p:extLst>
+      <p:ext uri="{BB962C8B-B14F-4D97-AF65-F5344CB8AC3E}">
+        <p14:creationId xmlns:p14="http://schemas.microsoft.com/office/powerpoint/2010/main" val="108486466"/>
+      </p:ext>
+    </p:extLst>
+  </p:cSld>
+  <p:clrMapOvr>
+    <a:masterClrMapping/>
+  </p:clrMapOvr>
+</p:sld>
+</file>
+
+<file path=ppt/slides/slide17.xml><?xml version="1.0" encoding="utf-8"?>
+<p:sld xmlns:a="http://schemas.openxmlformats.org/drawingml/2006/main" xmlns:r="http://schemas.openxmlformats.org/officeDocument/2006/relationships" xmlns:p="http://schemas.openxmlformats.org/presentationml/2006/main">
+  <p:cSld>
+    <p:spTree>
+      <p:nvGrpSpPr>
+        <p:cNvPr id="1" name=""/>
+        <p:cNvGrpSpPr/>
+        <p:nvPr/>
+      </p:nvGrpSpPr>
+      <p:grpSpPr>
+        <a:xfrm>
+          <a:off x="0" y="0"/>
+          <a:ext cx="0" cy="0"/>
+          <a:chOff x="0" y="0"/>
+          <a:chExt cx="0" cy="0"/>
+        </a:xfrm>
+      </p:grpSpPr>
+      <p:sp>
+        <p:nvSpPr>
+          <p:cNvPr id="2" name="Title 1">
+            <a:extLst>
+              <a:ext uri="{FF2B5EF4-FFF2-40B4-BE49-F238E27FC236}">
+                <a16:creationId xmlns:a16="http://schemas.microsoft.com/office/drawing/2014/main" id="{2A253EEA-2FB8-47D2-98DD-D66E81F80E86}"/>
+              </a:ext>
+            </a:extLst>
+          </p:cNvPr>
+          <p:cNvSpPr>
+            <a:spLocks noGrp="1"/>
+          </p:cNvSpPr>
+          <p:nvPr>
+            <p:ph type="title"/>
+          </p:nvPr>
+        </p:nvSpPr>
+        <p:spPr/>
+        <p:txBody>
+          <a:bodyPr/>
+          <a:lstStyle/>
+          <a:p>
+            <a:r>
+              <a:rPr lang="en-US" dirty="0"/>
+              <a:t>Some special characters</a:t>
+            </a:r>
+          </a:p>
+        </p:txBody>
+      </p:sp>
+      <p:sp>
+        <p:nvSpPr>
+          <p:cNvPr id="4" name="Slide Number Placeholder 3">
+            <a:extLst>
+              <a:ext uri="{FF2B5EF4-FFF2-40B4-BE49-F238E27FC236}">
+                <a16:creationId xmlns:a16="http://schemas.microsoft.com/office/drawing/2014/main" id="{84D106F0-A900-400C-9E7C-627857C675AB}"/>
+              </a:ext>
+            </a:extLst>
+          </p:cNvPr>
+          <p:cNvSpPr>
+            <a:spLocks noGrp="1"/>
+          </p:cNvSpPr>
+          <p:nvPr>
+            <p:ph type="sldNum" sz="quarter" idx="12"/>
+          </p:nvPr>
+        </p:nvSpPr>
+        <p:spPr/>
+        <p:txBody>
+          <a:bodyPr/>
+          <a:lstStyle/>
+          <a:p>
+            <a:fld id="{6D95AE55-B5F4-483D-AEFF-E8059F5502F5}" type="slidenum">
+              <a:rPr lang="en-US" smtClean="0"/>
+              <a:t>17</a:t>
             </a:fld>
             <a:endParaRPr lang="en-US"/>
           </a:p>
@@ -7481,7 +7996,7 @@
 </p:sld>
 </file>
 
-<file path=ppt/slides/slide16.xml><?xml version="1.0" encoding="utf-8"?>
+<file path=ppt/slides/slide18.xml><?xml version="1.0" encoding="utf-8"?>
 <p:sld xmlns:a="http://schemas.openxmlformats.org/drawingml/2006/main" xmlns:r="http://schemas.openxmlformats.org/officeDocument/2006/relationships" xmlns:p="http://schemas.openxmlformats.org/presentationml/2006/main">
   <p:cSld>
     <p:spTree>
@@ -7659,7 +8174,7 @@
           <a:p>
             <a:fld id="{6D95AE55-B5F4-483D-AEFF-E8059F5502F5}" type="slidenum">
               <a:rPr lang="en-US" smtClean="0"/>
-              <a:t>16</a:t>
+              <a:t>18</a:t>
             </a:fld>
             <a:endParaRPr lang="en-US"/>
           </a:p>
@@ -7678,7 +8193,7 @@
 </p:sld>
 </file>
 
-<file path=ppt/slides/slide17.xml><?xml version="1.0" encoding="utf-8"?>
+<file path=ppt/slides/slide19.xml><?xml version="1.0" encoding="utf-8"?>
 <p:sld xmlns:a="http://schemas.openxmlformats.org/drawingml/2006/main" xmlns:r="http://schemas.openxmlformats.org/officeDocument/2006/relationships" xmlns:p="http://schemas.openxmlformats.org/presentationml/2006/main">
   <p:cSld>
     <p:spTree>
@@ -7856,7 +8371,7 @@
           <a:p>
             <a:fld id="{6D95AE55-B5F4-483D-AEFF-E8059F5502F5}" type="slidenum">
               <a:rPr lang="en-US" smtClean="0"/>
-              <a:t>17</a:t>
+              <a:t>19</a:t>
             </a:fld>
             <a:endParaRPr lang="en-US"/>
           </a:p>
@@ -8099,409 +8614,6 @@
 </p:sld>
 </file>
 
-<file path=ppt/slides/slide18.xml><?xml version="1.0" encoding="utf-8"?>
-<p:sld xmlns:a="http://schemas.openxmlformats.org/drawingml/2006/main" xmlns:r="http://schemas.openxmlformats.org/officeDocument/2006/relationships" xmlns:p="http://schemas.openxmlformats.org/presentationml/2006/main">
-  <p:cSld>
-    <p:spTree>
-      <p:nvGrpSpPr>
-        <p:cNvPr id="1" name=""/>
-        <p:cNvGrpSpPr/>
-        <p:nvPr/>
-      </p:nvGrpSpPr>
-      <p:grpSpPr>
-        <a:xfrm>
-          <a:off x="0" y="0"/>
-          <a:ext cx="0" cy="0"/>
-          <a:chOff x="0" y="0"/>
-          <a:chExt cx="0" cy="0"/>
-        </a:xfrm>
-      </p:grpSpPr>
-      <p:sp>
-        <p:nvSpPr>
-          <p:cNvPr id="2" name="Title 1">
-            <a:extLst>
-              <a:ext uri="{FF2B5EF4-FFF2-40B4-BE49-F238E27FC236}">
-                <a16:creationId xmlns:a16="http://schemas.microsoft.com/office/drawing/2014/main" id="{37C8698F-93FD-4DBF-B8A4-468087901220}"/>
-              </a:ext>
-            </a:extLst>
-          </p:cNvPr>
-          <p:cNvSpPr>
-            <a:spLocks noGrp="1"/>
-          </p:cNvSpPr>
-          <p:nvPr>
-            <p:ph type="title"/>
-          </p:nvPr>
-        </p:nvSpPr>
-        <p:spPr/>
-        <p:txBody>
-          <a:bodyPr/>
-          <a:lstStyle/>
-          <a:p>
-            <a:r>
-              <a:rPr lang="en-US" dirty="0"/>
-              <a:t>One last RStudio tip</a:t>
-            </a:r>
-          </a:p>
-        </p:txBody>
-      </p:sp>
-      <p:sp>
-        <p:nvSpPr>
-          <p:cNvPr id="3" name="Content Placeholder 2">
-            <a:extLst>
-              <a:ext uri="{FF2B5EF4-FFF2-40B4-BE49-F238E27FC236}">
-                <a16:creationId xmlns:a16="http://schemas.microsoft.com/office/drawing/2014/main" id="{A1F94D6F-CE3A-4751-B559-9D1C7782D83C}"/>
-              </a:ext>
-            </a:extLst>
-          </p:cNvPr>
-          <p:cNvSpPr>
-            <a:spLocks noGrp="1"/>
-          </p:cNvSpPr>
-          <p:nvPr>
-            <p:ph idx="1"/>
-          </p:nvPr>
-        </p:nvSpPr>
-        <p:spPr>
-          <a:xfrm>
-            <a:off x="561976" y="1825625"/>
-            <a:ext cx="5019674" cy="4351338"/>
-          </a:xfrm>
-        </p:spPr>
-        <p:txBody>
-          <a:bodyPr/>
-          <a:lstStyle/>
-          <a:p>
-            <a:r>
-              <a:rPr lang="en-US" dirty="0"/>
-              <a:t>If you’d like, you can change  the appearance of RStudio (color &amp; theme)</a:t>
-            </a:r>
-          </a:p>
-          <a:p>
-            <a:r>
-              <a:rPr lang="en-US" dirty="0"/>
-              <a:t>Go to Tools -&gt; Global Options -&gt; Appearance </a:t>
-            </a:r>
-          </a:p>
-          <a:p>
-            <a:r>
-              <a:rPr lang="en-US" dirty="0"/>
-              <a:t>Choose an “Editor Theme” that you like </a:t>
-            </a:r>
-          </a:p>
-        </p:txBody>
-      </p:sp>
-      <p:sp>
-        <p:nvSpPr>
-          <p:cNvPr id="4" name="Slide Number Placeholder 3">
-            <a:extLst>
-              <a:ext uri="{FF2B5EF4-FFF2-40B4-BE49-F238E27FC236}">
-                <a16:creationId xmlns:a16="http://schemas.microsoft.com/office/drawing/2014/main" id="{14033957-FB75-4C73-B92E-1FBC2F2819CD}"/>
-              </a:ext>
-            </a:extLst>
-          </p:cNvPr>
-          <p:cNvSpPr>
-            <a:spLocks noGrp="1"/>
-          </p:cNvSpPr>
-          <p:nvPr>
-            <p:ph type="sldNum" sz="quarter" idx="12"/>
-          </p:nvPr>
-        </p:nvSpPr>
-        <p:spPr/>
-        <p:txBody>
-          <a:bodyPr/>
-          <a:lstStyle/>
-          <a:p>
-            <a:fld id="{6D95AE55-B5F4-483D-AEFF-E8059F5502F5}" type="slidenum">
-              <a:rPr lang="en-US" smtClean="0"/>
-              <a:t>18</a:t>
-            </a:fld>
-            <a:endParaRPr lang="en-US"/>
-          </a:p>
-        </p:txBody>
-      </p:sp>
-      <p:grpSp>
-        <p:nvGrpSpPr>
-          <p:cNvPr id="7" name="Group 6">
-            <a:extLst>
-              <a:ext uri="{FF2B5EF4-FFF2-40B4-BE49-F238E27FC236}">
-                <a16:creationId xmlns:a16="http://schemas.microsoft.com/office/drawing/2014/main" id="{7A7CF4DC-449A-41C4-8285-D1E3C3766289}"/>
-              </a:ext>
-            </a:extLst>
-          </p:cNvPr>
-          <p:cNvGrpSpPr/>
-          <p:nvPr/>
-        </p:nvGrpSpPr>
-        <p:grpSpPr>
-          <a:xfrm>
-            <a:off x="6531658" y="1271899"/>
-            <a:ext cx="4822141" cy="5267013"/>
-            <a:chOff x="5169584" y="1405518"/>
-            <a:chExt cx="4822141" cy="5267013"/>
-          </a:xfrm>
-        </p:grpSpPr>
-        <p:pic>
-          <p:nvPicPr>
-            <p:cNvPr id="5" name="Picture 4">
-              <a:extLst>
-                <a:ext uri="{FF2B5EF4-FFF2-40B4-BE49-F238E27FC236}">
-                  <a16:creationId xmlns:a16="http://schemas.microsoft.com/office/drawing/2014/main" id="{5560D7FF-42F9-428D-9BC9-01D33FFDF2B4}"/>
-                </a:ext>
-              </a:extLst>
-            </p:cNvPr>
-            <p:cNvPicPr>
-              <a:picLocks noChangeAspect="1"/>
-            </p:cNvPicPr>
-            <p:nvPr/>
-          </p:nvPicPr>
-          <p:blipFill>
-            <a:blip r:embed="rId2">
-              <a:extLst>
-                <a:ext uri="{28A0092B-C50C-407E-A947-70E740481C1C}">
-                  <a14:useLocalDpi xmlns:a14="http://schemas.microsoft.com/office/drawing/2010/main" val="0"/>
-                </a:ext>
-              </a:extLst>
-            </a:blip>
-            <a:stretch>
-              <a:fillRect/>
-            </a:stretch>
-          </p:blipFill>
-          <p:spPr>
-            <a:xfrm>
-              <a:off x="5169584" y="1517076"/>
-              <a:ext cx="4812616" cy="5083749"/>
-            </a:xfrm>
-            <a:prstGeom prst="rect">
-              <a:avLst/>
-            </a:prstGeom>
-          </p:spPr>
-        </p:pic>
-        <p:pic>
-          <p:nvPicPr>
-            <p:cNvPr id="6" name="Picture 5">
-              <a:extLst>
-                <a:ext uri="{FF2B5EF4-FFF2-40B4-BE49-F238E27FC236}">
-                  <a16:creationId xmlns:a16="http://schemas.microsoft.com/office/drawing/2014/main" id="{92868C04-7947-4B58-8AFD-4439529D75CD}"/>
-                </a:ext>
-              </a:extLst>
-            </p:cNvPr>
-            <p:cNvPicPr>
-              <a:picLocks noChangeAspect="1"/>
-            </p:cNvPicPr>
-            <p:nvPr/>
-          </p:nvPicPr>
-          <p:blipFill rotWithShape="1">
-            <a:blip r:embed="rId3">
-              <a:extLst>
-                <a:ext uri="{28A0092B-C50C-407E-A947-70E740481C1C}">
-                  <a14:useLocalDpi xmlns:a14="http://schemas.microsoft.com/office/drawing/2010/main" val="0"/>
-                </a:ext>
-              </a:extLst>
-            </a:blip>
-            <a:srcRect l="18679" t="9920" r="12866"/>
-            <a:stretch/>
-          </p:blipFill>
-          <p:spPr>
-            <a:xfrm>
-              <a:off x="5305425" y="1405518"/>
-              <a:ext cx="4686300" cy="5267013"/>
-            </a:xfrm>
-            <a:prstGeom prst="rect">
-              <a:avLst/>
-            </a:prstGeom>
-          </p:spPr>
-        </p:pic>
-      </p:grpSp>
-    </p:spTree>
-    <p:extLst>
-      <p:ext uri="{BB962C8B-B14F-4D97-AF65-F5344CB8AC3E}">
-        <p14:creationId xmlns:p14="http://schemas.microsoft.com/office/powerpoint/2010/main" val="829208073"/>
-      </p:ext>
-    </p:extLst>
-  </p:cSld>
-  <p:clrMapOvr>
-    <a:masterClrMapping/>
-  </p:clrMapOvr>
-</p:sld>
-</file>
-
-<file path=ppt/slides/slide19.xml><?xml version="1.0" encoding="utf-8"?>
-<p:sld xmlns:a="http://schemas.openxmlformats.org/drawingml/2006/main" xmlns:r="http://schemas.openxmlformats.org/officeDocument/2006/relationships" xmlns:p="http://schemas.openxmlformats.org/presentationml/2006/main">
-  <p:cSld>
-    <p:spTree>
-      <p:nvGrpSpPr>
-        <p:cNvPr id="1" name=""/>
-        <p:cNvGrpSpPr/>
-        <p:nvPr/>
-      </p:nvGrpSpPr>
-      <p:grpSpPr>
-        <a:xfrm>
-          <a:off x="0" y="0"/>
-          <a:ext cx="0" cy="0"/>
-          <a:chOff x="0" y="0"/>
-          <a:chExt cx="0" cy="0"/>
-        </a:xfrm>
-      </p:grpSpPr>
-      <p:sp>
-        <p:nvSpPr>
-          <p:cNvPr id="2" name="Title 1">
-            <a:extLst>
-              <a:ext uri="{FF2B5EF4-FFF2-40B4-BE49-F238E27FC236}">
-                <a16:creationId xmlns:a16="http://schemas.microsoft.com/office/drawing/2014/main" id="{7AE1D199-FEFA-48C9-B2D4-50E92F39F863}"/>
-              </a:ext>
-            </a:extLst>
-          </p:cNvPr>
-          <p:cNvSpPr>
-            <a:spLocks noGrp="1"/>
-          </p:cNvSpPr>
-          <p:nvPr>
-            <p:ph type="title"/>
-          </p:nvPr>
-        </p:nvSpPr>
-        <p:spPr/>
-        <p:txBody>
-          <a:bodyPr/>
-          <a:lstStyle/>
-          <a:p>
-            <a:r>
-              <a:rPr lang="en-US" dirty="0"/>
-              <a:t>RStudio Summary</a:t>
-            </a:r>
-          </a:p>
-        </p:txBody>
-      </p:sp>
-      <p:sp>
-        <p:nvSpPr>
-          <p:cNvPr id="3" name="Content Placeholder 2">
-            <a:extLst>
-              <a:ext uri="{FF2B5EF4-FFF2-40B4-BE49-F238E27FC236}">
-                <a16:creationId xmlns:a16="http://schemas.microsoft.com/office/drawing/2014/main" id="{43D43A62-1652-40C1-9E53-7EAECB20B311}"/>
-              </a:ext>
-            </a:extLst>
-          </p:cNvPr>
-          <p:cNvSpPr>
-            <a:spLocks noGrp="1"/>
-          </p:cNvSpPr>
-          <p:nvPr>
-            <p:ph idx="1"/>
-          </p:nvPr>
-        </p:nvSpPr>
-        <p:spPr>
-          <a:xfrm>
-            <a:off x="3595954" y="1825625"/>
-            <a:ext cx="7757845" cy="4351338"/>
-          </a:xfrm>
-        </p:spPr>
-        <p:txBody>
-          <a:bodyPr>
-            <a:normAutofit lnSpcReduction="10000"/>
-          </a:bodyPr>
-          <a:lstStyle/>
-          <a:p>
-            <a:pPr marL="0" indent="0">
-              <a:buNone/>
-            </a:pPr>
-            <a:r>
-              <a:rPr lang="en-US" b="1" u="sng" dirty="0"/>
-              <a:t>What we have learned</a:t>
-            </a:r>
-          </a:p>
-          <a:p>
-            <a:r>
-              <a:rPr lang="en-US" dirty="0"/>
-              <a:t>How to open a RStudio project</a:t>
-            </a:r>
-          </a:p>
-          <a:p>
-            <a:r>
-              <a:rPr lang="en-US" dirty="0"/>
-              <a:t>4 panes in RStudio</a:t>
-            </a:r>
-          </a:p>
-          <a:p>
-            <a:r>
-              <a:rPr lang="en-US" dirty="0"/>
-              <a:t>How to run a line</a:t>
-            </a:r>
-          </a:p>
-          <a:p>
-            <a:r>
-              <a:rPr lang="en-US" dirty="0"/>
-              <a:t>Difference between script &amp; console</a:t>
-            </a:r>
-          </a:p>
-          <a:p>
-            <a:r>
-              <a:rPr lang="en-US" dirty="0"/>
-              <a:t>Autocomplete for functions &amp; variables</a:t>
-            </a:r>
-          </a:p>
-          <a:p>
-            <a:r>
-              <a:rPr lang="en-US" dirty="0"/>
-              <a:t>Highlighting a word</a:t>
-            </a:r>
-          </a:p>
-          <a:p>
-            <a:r>
-              <a:rPr lang="en-US" dirty="0"/>
-              <a:t>Help!</a:t>
-            </a:r>
-          </a:p>
-          <a:p>
-            <a:r>
-              <a:rPr lang="en-US" dirty="0"/>
-              <a:t>Viewing a dataframe</a:t>
-            </a:r>
-          </a:p>
-          <a:p>
-            <a:endParaRPr lang="en-US" dirty="0"/>
-          </a:p>
-          <a:p>
-            <a:endParaRPr lang="en-US" dirty="0"/>
-          </a:p>
-        </p:txBody>
-      </p:sp>
-      <p:sp>
-        <p:nvSpPr>
-          <p:cNvPr id="4" name="Slide Number Placeholder 3">
-            <a:extLst>
-              <a:ext uri="{FF2B5EF4-FFF2-40B4-BE49-F238E27FC236}">
-                <a16:creationId xmlns:a16="http://schemas.microsoft.com/office/drawing/2014/main" id="{C0A82A11-6434-40F6-862F-DACD0180D393}"/>
-              </a:ext>
-            </a:extLst>
-          </p:cNvPr>
-          <p:cNvSpPr>
-            <a:spLocks noGrp="1"/>
-          </p:cNvSpPr>
-          <p:nvPr>
-            <p:ph type="sldNum" sz="quarter" idx="12"/>
-          </p:nvPr>
-        </p:nvSpPr>
-        <p:spPr/>
-        <p:txBody>
-          <a:bodyPr/>
-          <a:lstStyle/>
-          <a:p>
-            <a:fld id="{6D95AE55-B5F4-483D-AEFF-E8059F5502F5}" type="slidenum">
-              <a:rPr lang="en-US" smtClean="0"/>
-              <a:t>19</a:t>
-            </a:fld>
-            <a:endParaRPr lang="en-US"/>
-          </a:p>
-        </p:txBody>
-      </p:sp>
-    </p:spTree>
-    <p:extLst>
-      <p:ext uri="{BB962C8B-B14F-4D97-AF65-F5344CB8AC3E}">
-        <p14:creationId xmlns:p14="http://schemas.microsoft.com/office/powerpoint/2010/main" val="2223636367"/>
-      </p:ext>
-    </p:extLst>
-  </p:cSld>
-  <p:clrMapOvr>
-    <a:masterClrMapping/>
-  </p:clrMapOvr>
-</p:sld>
-</file>
-
 <file path=ppt/slides/slide2.xml><?xml version="1.0" encoding="utf-8"?>
 <p:sld xmlns:a="http://schemas.openxmlformats.org/drawingml/2006/main" xmlns:r="http://schemas.openxmlformats.org/officeDocument/2006/relationships" xmlns:p="http://schemas.openxmlformats.org/presentationml/2006/main">
   <p:cSld>
@@ -8566,7 +8678,7 @@
         <p:spPr>
           <a:xfrm>
             <a:off x="457201" y="1583684"/>
-            <a:ext cx="7971182" cy="4772967"/>
+            <a:ext cx="7571678" cy="4772967"/>
           </a:xfrm>
         </p:spPr>
         <p:txBody>
@@ -8602,32 +8714,13 @@
           <a:p>
             <a:r>
               <a:rPr lang="en-US" dirty="0"/>
-              <a:t>Think of R as notepad and RStudio as MS Word </a:t>
-            </a:r>
-          </a:p>
-          <a:p>
-            <a:pPr lvl="1"/>
+              <a:t>Software Center might call R the “R Project”; avoid calling it that. </a:t>
+            </a:r>
+          </a:p>
+          <a:p>
             <a:r>
               <a:rPr lang="en-US" dirty="0"/>
-              <a:t>More powerful features and is much more user friendly</a:t>
-            </a:r>
-          </a:p>
-          <a:p>
-            <a:pPr lvl="1"/>
-            <a:endParaRPr lang="en-US" dirty="0"/>
-          </a:p>
-          <a:p>
-            <a:r>
-              <a:rPr lang="en-US" dirty="0"/>
-              <a:t>Software Center calls R the “R Project”; avoid calling it that. We’ll be using </a:t>
-            </a:r>
-            <a:r>
-              <a:rPr lang="en-US" dirty="0" err="1"/>
-              <a:t>RProjects</a:t>
-            </a:r>
-            <a:r>
-              <a:rPr lang="en-US" dirty="0"/>
-              <a:t> which is a very different concept </a:t>
+              <a:t>We’ll be using RStudio Projects (sometimes called R Projects) which is a very different concept </a:t>
             </a:r>
           </a:p>
         </p:txBody>
@@ -8787,6 +8880,409 @@
           <p:cNvPr id="2" name="Title 1">
             <a:extLst>
               <a:ext uri="{FF2B5EF4-FFF2-40B4-BE49-F238E27FC236}">
+                <a16:creationId xmlns:a16="http://schemas.microsoft.com/office/drawing/2014/main" id="{37C8698F-93FD-4DBF-B8A4-468087901220}"/>
+              </a:ext>
+            </a:extLst>
+          </p:cNvPr>
+          <p:cNvSpPr>
+            <a:spLocks noGrp="1"/>
+          </p:cNvSpPr>
+          <p:nvPr>
+            <p:ph type="title"/>
+          </p:nvPr>
+        </p:nvSpPr>
+        <p:spPr/>
+        <p:txBody>
+          <a:bodyPr/>
+          <a:lstStyle/>
+          <a:p>
+            <a:r>
+              <a:rPr lang="en-US" dirty="0"/>
+              <a:t>One last RStudio tip</a:t>
+            </a:r>
+          </a:p>
+        </p:txBody>
+      </p:sp>
+      <p:sp>
+        <p:nvSpPr>
+          <p:cNvPr id="3" name="Content Placeholder 2">
+            <a:extLst>
+              <a:ext uri="{FF2B5EF4-FFF2-40B4-BE49-F238E27FC236}">
+                <a16:creationId xmlns:a16="http://schemas.microsoft.com/office/drawing/2014/main" id="{A1F94D6F-CE3A-4751-B559-9D1C7782D83C}"/>
+              </a:ext>
+            </a:extLst>
+          </p:cNvPr>
+          <p:cNvSpPr>
+            <a:spLocks noGrp="1"/>
+          </p:cNvSpPr>
+          <p:nvPr>
+            <p:ph idx="1"/>
+          </p:nvPr>
+        </p:nvSpPr>
+        <p:spPr>
+          <a:xfrm>
+            <a:off x="561976" y="1825625"/>
+            <a:ext cx="5019674" cy="4351338"/>
+          </a:xfrm>
+        </p:spPr>
+        <p:txBody>
+          <a:bodyPr/>
+          <a:lstStyle/>
+          <a:p>
+            <a:r>
+              <a:rPr lang="en-US" dirty="0"/>
+              <a:t>If you’d like, you can change  the appearance of RStudio (color &amp; theme)</a:t>
+            </a:r>
+          </a:p>
+          <a:p>
+            <a:r>
+              <a:rPr lang="en-US" dirty="0"/>
+              <a:t>Go to Tools -&gt; Global Options -&gt; Appearance </a:t>
+            </a:r>
+          </a:p>
+          <a:p>
+            <a:r>
+              <a:rPr lang="en-US" dirty="0"/>
+              <a:t>Choose an “Editor Theme” that you like </a:t>
+            </a:r>
+          </a:p>
+        </p:txBody>
+      </p:sp>
+      <p:sp>
+        <p:nvSpPr>
+          <p:cNvPr id="4" name="Slide Number Placeholder 3">
+            <a:extLst>
+              <a:ext uri="{FF2B5EF4-FFF2-40B4-BE49-F238E27FC236}">
+                <a16:creationId xmlns:a16="http://schemas.microsoft.com/office/drawing/2014/main" id="{14033957-FB75-4C73-B92E-1FBC2F2819CD}"/>
+              </a:ext>
+            </a:extLst>
+          </p:cNvPr>
+          <p:cNvSpPr>
+            <a:spLocks noGrp="1"/>
+          </p:cNvSpPr>
+          <p:nvPr>
+            <p:ph type="sldNum" sz="quarter" idx="12"/>
+          </p:nvPr>
+        </p:nvSpPr>
+        <p:spPr/>
+        <p:txBody>
+          <a:bodyPr/>
+          <a:lstStyle/>
+          <a:p>
+            <a:fld id="{6D95AE55-B5F4-483D-AEFF-E8059F5502F5}" type="slidenum">
+              <a:rPr lang="en-US" smtClean="0"/>
+              <a:t>20</a:t>
+            </a:fld>
+            <a:endParaRPr lang="en-US"/>
+          </a:p>
+        </p:txBody>
+      </p:sp>
+      <p:grpSp>
+        <p:nvGrpSpPr>
+          <p:cNvPr id="7" name="Group 6">
+            <a:extLst>
+              <a:ext uri="{FF2B5EF4-FFF2-40B4-BE49-F238E27FC236}">
+                <a16:creationId xmlns:a16="http://schemas.microsoft.com/office/drawing/2014/main" id="{7A7CF4DC-449A-41C4-8285-D1E3C3766289}"/>
+              </a:ext>
+            </a:extLst>
+          </p:cNvPr>
+          <p:cNvGrpSpPr/>
+          <p:nvPr/>
+        </p:nvGrpSpPr>
+        <p:grpSpPr>
+          <a:xfrm>
+            <a:off x="6531658" y="1271899"/>
+            <a:ext cx="4822141" cy="5267013"/>
+            <a:chOff x="5169584" y="1405518"/>
+            <a:chExt cx="4822141" cy="5267013"/>
+          </a:xfrm>
+        </p:grpSpPr>
+        <p:pic>
+          <p:nvPicPr>
+            <p:cNvPr id="5" name="Picture 4">
+              <a:extLst>
+                <a:ext uri="{FF2B5EF4-FFF2-40B4-BE49-F238E27FC236}">
+                  <a16:creationId xmlns:a16="http://schemas.microsoft.com/office/drawing/2014/main" id="{5560D7FF-42F9-428D-9BC9-01D33FFDF2B4}"/>
+                </a:ext>
+              </a:extLst>
+            </p:cNvPr>
+            <p:cNvPicPr>
+              <a:picLocks noChangeAspect="1"/>
+            </p:cNvPicPr>
+            <p:nvPr/>
+          </p:nvPicPr>
+          <p:blipFill>
+            <a:blip r:embed="rId2">
+              <a:extLst>
+                <a:ext uri="{28A0092B-C50C-407E-A947-70E740481C1C}">
+                  <a14:useLocalDpi xmlns:a14="http://schemas.microsoft.com/office/drawing/2010/main" val="0"/>
+                </a:ext>
+              </a:extLst>
+            </a:blip>
+            <a:stretch>
+              <a:fillRect/>
+            </a:stretch>
+          </p:blipFill>
+          <p:spPr>
+            <a:xfrm>
+              <a:off x="5169584" y="1517076"/>
+              <a:ext cx="4812616" cy="5083749"/>
+            </a:xfrm>
+            <a:prstGeom prst="rect">
+              <a:avLst/>
+            </a:prstGeom>
+          </p:spPr>
+        </p:pic>
+        <p:pic>
+          <p:nvPicPr>
+            <p:cNvPr id="6" name="Picture 5">
+              <a:extLst>
+                <a:ext uri="{FF2B5EF4-FFF2-40B4-BE49-F238E27FC236}">
+                  <a16:creationId xmlns:a16="http://schemas.microsoft.com/office/drawing/2014/main" id="{92868C04-7947-4B58-8AFD-4439529D75CD}"/>
+                </a:ext>
+              </a:extLst>
+            </p:cNvPr>
+            <p:cNvPicPr>
+              <a:picLocks noChangeAspect="1"/>
+            </p:cNvPicPr>
+            <p:nvPr/>
+          </p:nvPicPr>
+          <p:blipFill rotWithShape="1">
+            <a:blip r:embed="rId3">
+              <a:extLst>
+                <a:ext uri="{28A0092B-C50C-407E-A947-70E740481C1C}">
+                  <a14:useLocalDpi xmlns:a14="http://schemas.microsoft.com/office/drawing/2010/main" val="0"/>
+                </a:ext>
+              </a:extLst>
+            </a:blip>
+            <a:srcRect l="18679" t="9920" r="12866"/>
+            <a:stretch/>
+          </p:blipFill>
+          <p:spPr>
+            <a:xfrm>
+              <a:off x="5305425" y="1405518"/>
+              <a:ext cx="4686300" cy="5267013"/>
+            </a:xfrm>
+            <a:prstGeom prst="rect">
+              <a:avLst/>
+            </a:prstGeom>
+          </p:spPr>
+        </p:pic>
+      </p:grpSp>
+    </p:spTree>
+    <p:extLst>
+      <p:ext uri="{BB962C8B-B14F-4D97-AF65-F5344CB8AC3E}">
+        <p14:creationId xmlns:p14="http://schemas.microsoft.com/office/powerpoint/2010/main" val="829208073"/>
+      </p:ext>
+    </p:extLst>
+  </p:cSld>
+  <p:clrMapOvr>
+    <a:masterClrMapping/>
+  </p:clrMapOvr>
+</p:sld>
+</file>
+
+<file path=ppt/slides/slide21.xml><?xml version="1.0" encoding="utf-8"?>
+<p:sld xmlns:a="http://schemas.openxmlformats.org/drawingml/2006/main" xmlns:r="http://schemas.openxmlformats.org/officeDocument/2006/relationships" xmlns:p="http://schemas.openxmlformats.org/presentationml/2006/main">
+  <p:cSld>
+    <p:spTree>
+      <p:nvGrpSpPr>
+        <p:cNvPr id="1" name=""/>
+        <p:cNvGrpSpPr/>
+        <p:nvPr/>
+      </p:nvGrpSpPr>
+      <p:grpSpPr>
+        <a:xfrm>
+          <a:off x="0" y="0"/>
+          <a:ext cx="0" cy="0"/>
+          <a:chOff x="0" y="0"/>
+          <a:chExt cx="0" cy="0"/>
+        </a:xfrm>
+      </p:grpSpPr>
+      <p:sp>
+        <p:nvSpPr>
+          <p:cNvPr id="2" name="Title 1">
+            <a:extLst>
+              <a:ext uri="{FF2B5EF4-FFF2-40B4-BE49-F238E27FC236}">
+                <a16:creationId xmlns:a16="http://schemas.microsoft.com/office/drawing/2014/main" id="{7AE1D199-FEFA-48C9-B2D4-50E92F39F863}"/>
+              </a:ext>
+            </a:extLst>
+          </p:cNvPr>
+          <p:cNvSpPr>
+            <a:spLocks noGrp="1"/>
+          </p:cNvSpPr>
+          <p:nvPr>
+            <p:ph type="title"/>
+          </p:nvPr>
+        </p:nvSpPr>
+        <p:spPr/>
+        <p:txBody>
+          <a:bodyPr/>
+          <a:lstStyle/>
+          <a:p>
+            <a:r>
+              <a:rPr lang="en-US" dirty="0"/>
+              <a:t>RStudio Summary</a:t>
+            </a:r>
+          </a:p>
+        </p:txBody>
+      </p:sp>
+      <p:sp>
+        <p:nvSpPr>
+          <p:cNvPr id="3" name="Content Placeholder 2">
+            <a:extLst>
+              <a:ext uri="{FF2B5EF4-FFF2-40B4-BE49-F238E27FC236}">
+                <a16:creationId xmlns:a16="http://schemas.microsoft.com/office/drawing/2014/main" id="{43D43A62-1652-40C1-9E53-7EAECB20B311}"/>
+              </a:ext>
+            </a:extLst>
+          </p:cNvPr>
+          <p:cNvSpPr>
+            <a:spLocks noGrp="1"/>
+          </p:cNvSpPr>
+          <p:nvPr>
+            <p:ph idx="1"/>
+          </p:nvPr>
+        </p:nvSpPr>
+        <p:spPr>
+          <a:xfrm>
+            <a:off x="3595954" y="1825625"/>
+            <a:ext cx="7757845" cy="4351338"/>
+          </a:xfrm>
+        </p:spPr>
+        <p:txBody>
+          <a:bodyPr>
+            <a:normAutofit lnSpcReduction="10000"/>
+          </a:bodyPr>
+          <a:lstStyle/>
+          <a:p>
+            <a:pPr marL="0" indent="0">
+              <a:buNone/>
+            </a:pPr>
+            <a:r>
+              <a:rPr lang="en-US" b="1" u="sng" dirty="0"/>
+              <a:t>What we have learned</a:t>
+            </a:r>
+          </a:p>
+          <a:p>
+            <a:r>
+              <a:rPr lang="en-US" dirty="0"/>
+              <a:t>How to open a RStudio project</a:t>
+            </a:r>
+          </a:p>
+          <a:p>
+            <a:r>
+              <a:rPr lang="en-US" dirty="0"/>
+              <a:t>4 panes in RStudio</a:t>
+            </a:r>
+          </a:p>
+          <a:p>
+            <a:r>
+              <a:rPr lang="en-US" dirty="0"/>
+              <a:t>How to run a line</a:t>
+            </a:r>
+          </a:p>
+          <a:p>
+            <a:r>
+              <a:rPr lang="en-US" dirty="0"/>
+              <a:t>Difference between script &amp; console</a:t>
+            </a:r>
+          </a:p>
+          <a:p>
+            <a:r>
+              <a:rPr lang="en-US" dirty="0"/>
+              <a:t>Autocomplete for functions &amp; variables</a:t>
+            </a:r>
+          </a:p>
+          <a:p>
+            <a:r>
+              <a:rPr lang="en-US" dirty="0"/>
+              <a:t>Highlighting a word</a:t>
+            </a:r>
+          </a:p>
+          <a:p>
+            <a:r>
+              <a:rPr lang="en-US" dirty="0"/>
+              <a:t>Help!</a:t>
+            </a:r>
+          </a:p>
+          <a:p>
+            <a:r>
+              <a:rPr lang="en-US" dirty="0"/>
+              <a:t>Viewing a dataframe</a:t>
+            </a:r>
+          </a:p>
+          <a:p>
+            <a:endParaRPr lang="en-US" dirty="0"/>
+          </a:p>
+          <a:p>
+            <a:endParaRPr lang="en-US" dirty="0"/>
+          </a:p>
+        </p:txBody>
+      </p:sp>
+      <p:sp>
+        <p:nvSpPr>
+          <p:cNvPr id="4" name="Slide Number Placeholder 3">
+            <a:extLst>
+              <a:ext uri="{FF2B5EF4-FFF2-40B4-BE49-F238E27FC236}">
+                <a16:creationId xmlns:a16="http://schemas.microsoft.com/office/drawing/2014/main" id="{C0A82A11-6434-40F6-862F-DACD0180D393}"/>
+              </a:ext>
+            </a:extLst>
+          </p:cNvPr>
+          <p:cNvSpPr>
+            <a:spLocks noGrp="1"/>
+          </p:cNvSpPr>
+          <p:nvPr>
+            <p:ph type="sldNum" sz="quarter" idx="12"/>
+          </p:nvPr>
+        </p:nvSpPr>
+        <p:spPr/>
+        <p:txBody>
+          <a:bodyPr/>
+          <a:lstStyle/>
+          <a:p>
+            <a:fld id="{6D95AE55-B5F4-483D-AEFF-E8059F5502F5}" type="slidenum">
+              <a:rPr lang="en-US" smtClean="0"/>
+              <a:t>21</a:t>
+            </a:fld>
+            <a:endParaRPr lang="en-US"/>
+          </a:p>
+        </p:txBody>
+      </p:sp>
+    </p:spTree>
+    <p:extLst>
+      <p:ext uri="{BB962C8B-B14F-4D97-AF65-F5344CB8AC3E}">
+        <p14:creationId xmlns:p14="http://schemas.microsoft.com/office/powerpoint/2010/main" val="2223636367"/>
+      </p:ext>
+    </p:extLst>
+  </p:cSld>
+  <p:clrMapOvr>
+    <a:masterClrMapping/>
+  </p:clrMapOvr>
+</p:sld>
+</file>
+
+<file path=ppt/slides/slide22.xml><?xml version="1.0" encoding="utf-8"?>
+<p:sld xmlns:a="http://schemas.openxmlformats.org/drawingml/2006/main" xmlns:r="http://schemas.openxmlformats.org/officeDocument/2006/relationships" xmlns:p="http://schemas.openxmlformats.org/presentationml/2006/main">
+  <p:cSld>
+    <p:spTree>
+      <p:nvGrpSpPr>
+        <p:cNvPr id="1" name=""/>
+        <p:cNvGrpSpPr/>
+        <p:nvPr/>
+      </p:nvGrpSpPr>
+      <p:grpSpPr>
+        <a:xfrm>
+          <a:off x="0" y="0"/>
+          <a:ext cx="0" cy="0"/>
+          <a:chOff x="0" y="0"/>
+          <a:chExt cx="0" cy="0"/>
+        </a:xfrm>
+      </p:grpSpPr>
+      <p:sp>
+        <p:nvSpPr>
+          <p:cNvPr id="2" name="Title 1">
+            <a:extLst>
+              <a:ext uri="{FF2B5EF4-FFF2-40B4-BE49-F238E27FC236}">
                 <a16:creationId xmlns:a16="http://schemas.microsoft.com/office/drawing/2014/main" id="{6CB60313-92C7-46D0-8673-5BC985087B33}"/>
               </a:ext>
             </a:extLst>
@@ -8900,7 +9396,7 @@
           <a:p>
             <a:fld id="{6D95AE55-B5F4-483D-AEFF-E8059F5502F5}" type="slidenum">
               <a:rPr lang="en-US" smtClean="0"/>
-              <a:t>20</a:t>
+              <a:t>22</a:t>
             </a:fld>
             <a:endParaRPr lang="en-US"/>
           </a:p>
@@ -9634,7 +10130,7 @@
 </p:sld>
 </file>
 
-<file path=ppt/slides/slide21.xml><?xml version="1.0" encoding="utf-8"?>
+<file path=ppt/slides/slide23.xml><?xml version="1.0" encoding="utf-8"?>
 <p:sld xmlns:a="http://schemas.openxmlformats.org/drawingml/2006/main" xmlns:r="http://schemas.openxmlformats.org/officeDocument/2006/relationships" xmlns:p="http://schemas.openxmlformats.org/presentationml/2006/main">
   <p:cSld>
     <p:spTree>
@@ -10143,7 +10639,7 @@
           <a:p>
             <a:fld id="{6D95AE55-B5F4-483D-AEFF-E8059F5502F5}" type="slidenum">
               <a:rPr lang="en-US" smtClean="0"/>
-              <a:t>21</a:t>
+              <a:t>23</a:t>
             </a:fld>
             <a:endParaRPr lang="en-US"/>
           </a:p>
@@ -10162,7 +10658,7 @@
 </p:sld>
 </file>
 
-<file path=ppt/slides/slide22.xml><?xml version="1.0" encoding="utf-8"?>
+<file path=ppt/slides/slide24.xml><?xml version="1.0" encoding="utf-8"?>
 <p:sld xmlns:a="http://schemas.openxmlformats.org/drawingml/2006/main" xmlns:r="http://schemas.openxmlformats.org/officeDocument/2006/relationships" xmlns:p="http://schemas.openxmlformats.org/presentationml/2006/main">
   <p:cSld>
     <p:spTree>
@@ -10671,7 +11167,7 @@
           <a:p>
             <a:fld id="{6D95AE55-B5F4-483D-AEFF-E8059F5502F5}" type="slidenum">
               <a:rPr lang="en-US" smtClean="0"/>
-              <a:t>22</a:t>
+              <a:t>24</a:t>
             </a:fld>
             <a:endParaRPr lang="en-US" dirty="0"/>
           </a:p>
@@ -11280,7 +11776,7 @@
 </p:sld>
 </file>
 
-<file path=ppt/slides/slide23.xml><?xml version="1.0" encoding="utf-8"?>
+<file path=ppt/slides/slide25.xml><?xml version="1.0" encoding="utf-8"?>
 <p:sld xmlns:a="http://schemas.openxmlformats.org/drawingml/2006/main" xmlns:r="http://schemas.openxmlformats.org/officeDocument/2006/relationships" xmlns:p="http://schemas.openxmlformats.org/presentationml/2006/main">
   <p:cSld>
     <p:spTree>
@@ -11719,7 +12215,7 @@
           <a:p>
             <a:fld id="{6D95AE55-B5F4-483D-AEFF-E8059F5502F5}" type="slidenum">
               <a:rPr lang="en-US" smtClean="0"/>
-              <a:t>23</a:t>
+              <a:t>25</a:t>
             </a:fld>
             <a:endParaRPr lang="en-US"/>
           </a:p>
@@ -12171,7 +12667,7 @@
 </p:sld>
 </file>
 
-<file path=ppt/slides/slide24.xml><?xml version="1.0" encoding="utf-8"?>
+<file path=ppt/slides/slide26.xml><?xml version="1.0" encoding="utf-8"?>
 <p:sld xmlns:a="http://schemas.openxmlformats.org/drawingml/2006/main" xmlns:r="http://schemas.openxmlformats.org/officeDocument/2006/relationships" xmlns:p="http://schemas.openxmlformats.org/presentationml/2006/main">
   <p:cSld>
     <p:spTree>
@@ -12610,7 +13106,7 @@
           <a:p>
             <a:fld id="{6D95AE55-B5F4-483D-AEFF-E8059F5502F5}" type="slidenum">
               <a:rPr lang="en-US" smtClean="0"/>
-              <a:t>24</a:t>
+              <a:t>26</a:t>
             </a:fld>
             <a:endParaRPr lang="en-US"/>
           </a:p>
@@ -13278,7 +13774,7 @@
                     </a:outerShdw>
                   </a:effectLst>
                 </a:rPr>
-                <a:t>R 4.3.2</a:t>
+                <a:t>R 4.4.3</a:t>
               </a:r>
             </a:p>
           </p:txBody>
@@ -13373,7 +13869,7 @@
             </a:r>
             <a:r>
               <a:rPr lang="en-US" sz="2400" dirty="0" err="1"/>
-              <a:t>RProj</a:t>
+              <a:t>Rproj</a:t>
             </a:r>
             <a:r>
               <a:rPr lang="en-US" sz="2400" dirty="0"/>
@@ -13473,7 +13969,7 @@
           <p:spPr>
             <a:xfrm>
               <a:off x="7181850" y="4543425"/>
-              <a:ext cx="4835979" cy="1200329"/>
+              <a:ext cx="4835979" cy="964469"/>
             </a:xfrm>
             <a:prstGeom prst="rect">
               <a:avLst/>
@@ -13492,7 +13988,7 @@
               </a:r>
               <a:r>
                 <a:rPr lang="en-US" sz="2400" dirty="0" err="1"/>
-                <a:t>RProj</a:t>
+                <a:t>Rproj</a:t>
               </a:r>
               <a:r>
                 <a:rPr lang="en-US" sz="2400" dirty="0"/>
@@ -19158,40 +19654,42 @@
           <a:chExt cx="0" cy="0"/>
         </a:xfrm>
       </p:grpSpPr>
-      <p:sp>
-        <p:nvSpPr>
-          <p:cNvPr id="2" name="Title 1">
-            <a:extLst>
-              <a:ext uri="{FF2B5EF4-FFF2-40B4-BE49-F238E27FC236}">
-                <a16:creationId xmlns:a16="http://schemas.microsoft.com/office/drawing/2014/main" id="{46533804-59EE-4F35-85DF-599B8A141C42}"/>
-              </a:ext>
-            </a:extLst>
-          </p:cNvPr>
-          <p:cNvSpPr>
-            <a:spLocks noGrp="1"/>
-          </p:cNvSpPr>
-          <p:nvPr>
-            <p:ph type="title"/>
-          </p:nvPr>
-        </p:nvSpPr>
-        <p:spPr/>
-        <p:txBody>
-          <a:bodyPr/>
-          <a:lstStyle/>
-          <a:p>
-            <a:r>
-              <a:rPr lang="en-US" dirty="0"/>
-              <a:t>RStudio cont.</a:t>
-            </a:r>
-          </a:p>
-        </p:txBody>
-      </p:sp>
+      <p:pic>
+        <p:nvPicPr>
+          <p:cNvPr id="11" name="Picture 10">
+            <a:extLst>
+              <a:ext uri="{FF2B5EF4-FFF2-40B4-BE49-F238E27FC236}">
+                <a16:creationId xmlns:a16="http://schemas.microsoft.com/office/drawing/2014/main" id="{AC10DB9E-D066-1455-AB7E-A2F62DC0621A}"/>
+              </a:ext>
+            </a:extLst>
+          </p:cNvPr>
+          <p:cNvPicPr>
+            <a:picLocks noChangeAspect="1"/>
+          </p:cNvPicPr>
+          <p:nvPr/>
+        </p:nvPicPr>
+        <p:blipFill>
+          <a:blip r:embed="rId2"/>
+          <a:stretch>
+            <a:fillRect/>
+          </a:stretch>
+        </p:blipFill>
+        <p:spPr>
+          <a:xfrm>
+            <a:off x="4039120" y="753140"/>
+            <a:ext cx="8118987" cy="5580754"/>
+          </a:xfrm>
+          <a:prstGeom prst="rect">
+            <a:avLst/>
+          </a:prstGeom>
+        </p:spPr>
+      </p:pic>
       <p:sp>
         <p:nvSpPr>
           <p:cNvPr id="3" name="Content Placeholder 2">
             <a:extLst>
               <a:ext uri="{FF2B5EF4-FFF2-40B4-BE49-F238E27FC236}">
-                <a16:creationId xmlns:a16="http://schemas.microsoft.com/office/drawing/2014/main" id="{0AECD268-A8EB-4A90-8647-C5C867157D26}"/>
+                <a16:creationId xmlns:a16="http://schemas.microsoft.com/office/drawing/2014/main" id="{E1EF86D2-5A61-89C2-E208-D1AF9277CFDE}"/>
               </a:ext>
             </a:extLst>
           </p:cNvPr>
@@ -19202,153 +19700,547 @@
             <p:ph idx="1"/>
           </p:nvPr>
         </p:nvSpPr>
-        <p:spPr/>
-        <p:txBody>
-          <a:bodyPr/>
-          <a:lstStyle/>
-          <a:p>
-            <a:r>
-              <a:rPr lang="en-US" dirty="0"/>
-              <a:t>Back to RStudio! </a:t>
-            </a:r>
-          </a:p>
-          <a:p>
-            <a:r>
-              <a:rPr lang="en-US" dirty="0"/>
-              <a:t>Let’s make those changes</a:t>
-            </a:r>
-          </a:p>
-          <a:p>
-            <a:endParaRPr lang="en-US" dirty="0"/>
-          </a:p>
-          <a:p>
-            <a:r>
-              <a:rPr lang="en-US" dirty="0"/>
-              <a:t>We’ll also go over:</a:t>
-            </a:r>
-          </a:p>
-          <a:p>
-            <a:pPr lvl="1"/>
-            <a:r>
-              <a:rPr lang="en-US" dirty="0"/>
-              <a:t>Advantages </a:t>
-            </a:r>
-            <a:r>
-              <a:rPr lang="en-US" dirty="0" err="1"/>
-              <a:t>ofRStudio</a:t>
-            </a:r>
-            <a:r>
-              <a:rPr lang="en-US" dirty="0"/>
-              <a:t> project</a:t>
-            </a:r>
-          </a:p>
-          <a:p>
-            <a:pPr lvl="1"/>
-            <a:r>
-              <a:rPr lang="en-US" dirty="0"/>
-              <a:t>How to open a script</a:t>
-            </a:r>
-          </a:p>
-          <a:p>
-            <a:pPr lvl="1"/>
-            <a:r>
-              <a:rPr lang="en-US" dirty="0"/>
-              <a:t>Highlighting a word</a:t>
-            </a:r>
-          </a:p>
-          <a:p>
-            <a:pPr lvl="1"/>
-            <a:r>
-              <a:rPr lang="en-US" dirty="0"/>
-              <a:t>Changing the theme</a:t>
-            </a:r>
-          </a:p>
-          <a:p>
-            <a:pPr lvl="1"/>
-            <a:r>
-              <a:rPr lang="en-US" dirty="0"/>
-              <a:t>Using the help tab</a:t>
-            </a:r>
-          </a:p>
-          <a:p>
-            <a:endParaRPr lang="en-US" dirty="0"/>
-          </a:p>
-        </p:txBody>
-      </p:sp>
-      <p:sp>
-        <p:nvSpPr>
-          <p:cNvPr id="4" name="Slide Number Placeholder 3">
-            <a:extLst>
-              <a:ext uri="{FF2B5EF4-FFF2-40B4-BE49-F238E27FC236}">
-                <a16:creationId xmlns:a16="http://schemas.microsoft.com/office/drawing/2014/main" id="{8645E207-B641-4C92-B3E8-1D146C119287}"/>
-              </a:ext>
-            </a:extLst>
-          </p:cNvPr>
-          <p:cNvSpPr>
-            <a:spLocks noGrp="1"/>
-          </p:cNvSpPr>
-          <p:nvPr>
-            <p:ph type="sldNum" sz="quarter" idx="12"/>
-          </p:nvPr>
-        </p:nvSpPr>
-        <p:spPr/>
-        <p:txBody>
-          <a:bodyPr/>
-          <a:lstStyle/>
-          <a:p>
-            <a:fld id="{6D95AE55-B5F4-483D-AEFF-E8059F5502F5}" type="slidenum">
-              <a:rPr lang="en-US" smtClean="0"/>
-              <a:t>9</a:t>
-            </a:fld>
-            <a:endParaRPr lang="en-US"/>
-          </a:p>
-        </p:txBody>
-      </p:sp>
-      <p:pic>
-        <p:nvPicPr>
-          <p:cNvPr id="10" name="Picture 9">
-            <a:extLst>
-              <a:ext uri="{FF2B5EF4-FFF2-40B4-BE49-F238E27FC236}">
-                <a16:creationId xmlns:a16="http://schemas.microsoft.com/office/drawing/2014/main" id="{AFED5C39-9275-46AD-AC80-05FB2F857AFC}"/>
-              </a:ext>
-            </a:extLst>
-          </p:cNvPr>
-          <p:cNvPicPr>
-            <a:picLocks noChangeAspect="1"/>
-          </p:cNvPicPr>
-          <p:nvPr/>
-        </p:nvPicPr>
-        <p:blipFill rotWithShape="1">
-          <a:blip r:embed="rId2">
-            <a:extLst>
-              <a:ext uri="{28A0092B-C50C-407E-A947-70E740481C1C}">
-                <a14:useLocalDpi xmlns:a14="http://schemas.microsoft.com/office/drawing/2010/main" val="0"/>
-              </a:ext>
-            </a:extLst>
-          </a:blip>
-          <a:srcRect l="18679" t="9920" r="12866"/>
-          <a:stretch/>
-        </p:blipFill>
         <p:spPr>
           <a:xfrm>
-            <a:off x="6096000" y="1309170"/>
-            <a:ext cx="4772025" cy="5363361"/>
+            <a:off x="123359" y="1324440"/>
+            <a:ext cx="3845312" cy="4351338"/>
           </a:xfrm>
-          <a:prstGeom prst="rect">
+        </p:spPr>
+        <p:txBody>
+          <a:bodyPr>
+            <a:normAutofit/>
+          </a:bodyPr>
+          <a:lstStyle/>
+          <a:p>
+            <a:pPr marL="0" indent="0">
+              <a:buNone/>
+            </a:pPr>
+            <a:r>
+              <a:rPr lang="en-US" sz="2400" dirty="0"/>
+              <a:t>Possibly worth checking (particularly if you installed R once upon a time):</a:t>
+            </a:r>
+          </a:p>
+          <a:p>
+            <a:pPr marL="0" indent="0">
+              <a:buNone/>
+            </a:pPr>
+            <a:endParaRPr lang="en-US" sz="2400" dirty="0"/>
+          </a:p>
+          <a:p>
+            <a:pPr marL="0" indent="0">
+              <a:buNone/>
+            </a:pPr>
+            <a:r>
+              <a:rPr lang="en-US" sz="2400" b="1" dirty="0"/>
+              <a:t>Did RStudio find the most recent version of R?</a:t>
+            </a:r>
+          </a:p>
+          <a:p>
+            <a:pPr marL="0" indent="0">
+              <a:buNone/>
+            </a:pPr>
+            <a:endParaRPr lang="en-US" sz="2400" dirty="0"/>
+          </a:p>
+          <a:p>
+            <a:pPr marL="0" indent="0">
+              <a:buNone/>
+            </a:pPr>
+            <a:r>
+              <a:rPr lang="en-US" sz="2400" dirty="0"/>
+              <a:t>It may say “R Project” with no version number – this is probably not the most recent</a:t>
+            </a:r>
+          </a:p>
+        </p:txBody>
+      </p:sp>
+      <p:sp>
+        <p:nvSpPr>
+          <p:cNvPr id="6" name="Oval 5">
+            <a:extLst>
+              <a:ext uri="{FF2B5EF4-FFF2-40B4-BE49-F238E27FC236}">
+                <a16:creationId xmlns:a16="http://schemas.microsoft.com/office/drawing/2014/main" id="{9A92405B-D8CA-54FC-CAAA-3C38477BCFED}"/>
+              </a:ext>
+            </a:extLst>
+          </p:cNvPr>
+          <p:cNvSpPr/>
+          <p:nvPr/>
+        </p:nvSpPr>
+        <p:spPr>
+          <a:xfrm>
+            <a:off x="5429759" y="1706136"/>
+            <a:ext cx="2342641" cy="403860"/>
+          </a:xfrm>
+          <a:prstGeom prst="ellipse">
             <a:avLst/>
           </a:prstGeom>
+          <a:noFill/>
+          <a:ln>
+            <a:solidFill>
+              <a:schemeClr val="accent1"/>
+            </a:solidFill>
+          </a:ln>
+          <a:effectLst>
+            <a:glow rad="228600">
+              <a:schemeClr val="accent5">
+                <a:satMod val="175000"/>
+                <a:alpha val="40000"/>
+              </a:schemeClr>
+            </a:glow>
+          </a:effectLst>
         </p:spPr>
-      </p:pic>
+        <p:style>
+          <a:lnRef idx="2">
+            <a:schemeClr val="accent1">
+              <a:shade val="15000"/>
+            </a:schemeClr>
+          </a:lnRef>
+          <a:fillRef idx="1">
+            <a:schemeClr val="accent1"/>
+          </a:fillRef>
+          <a:effectRef idx="0">
+            <a:schemeClr val="accent1"/>
+          </a:effectRef>
+          <a:fontRef idx="minor">
+            <a:schemeClr val="lt1"/>
+          </a:fontRef>
+        </p:style>
+        <p:txBody>
+          <a:bodyPr rtlCol="0" anchor="ctr"/>
+          <a:lstStyle/>
+          <a:p>
+            <a:pPr algn="ctr"/>
+            <a:endParaRPr lang="en-US"/>
+          </a:p>
+        </p:txBody>
+      </p:sp>
+      <p:grpSp>
+        <p:nvGrpSpPr>
+          <p:cNvPr id="7" name="Group 6">
+            <a:extLst>
+              <a:ext uri="{FF2B5EF4-FFF2-40B4-BE49-F238E27FC236}">
+                <a16:creationId xmlns:a16="http://schemas.microsoft.com/office/drawing/2014/main" id="{5E84EFEA-251B-BBD0-1ADA-1FF3569286FC}"/>
+              </a:ext>
+            </a:extLst>
+          </p:cNvPr>
+          <p:cNvGrpSpPr/>
+          <p:nvPr/>
+        </p:nvGrpSpPr>
+        <p:grpSpPr>
+          <a:xfrm rot="7031023">
+            <a:off x="7800212" y="1220114"/>
+            <a:ext cx="671865" cy="359508"/>
+            <a:chOff x="2486390" y="3889687"/>
+            <a:chExt cx="1172162" cy="250198"/>
+          </a:xfrm>
+        </p:grpSpPr>
+        <p:sp>
+          <p:nvSpPr>
+            <p:cNvPr id="8" name="Freeform: Shape 7">
+              <a:extLst>
+                <a:ext uri="{FF2B5EF4-FFF2-40B4-BE49-F238E27FC236}">
+                  <a16:creationId xmlns:a16="http://schemas.microsoft.com/office/drawing/2014/main" id="{A4DD124D-449F-66D3-4BDB-BDDD0B5C90A9}"/>
+                </a:ext>
+              </a:extLst>
+            </p:cNvPr>
+            <p:cNvSpPr/>
+            <p:nvPr/>
+          </p:nvSpPr>
+          <p:spPr>
+            <a:xfrm>
+              <a:off x="2682660" y="3931044"/>
+              <a:ext cx="975892" cy="208841"/>
+            </a:xfrm>
+            <a:custGeom>
+              <a:avLst/>
+              <a:gdLst>
+                <a:gd name="connsiteX0" fmla="*/ 0 w 3225521"/>
+                <a:gd name="connsiteY0" fmla="*/ 0 h 1128876"/>
+                <a:gd name="connsiteX1" fmla="*/ 1597688 w 3225521"/>
+                <a:gd name="connsiteY1" fmla="*/ 954593 h 1128876"/>
+                <a:gd name="connsiteX2" fmla="*/ 3225521 w 3225521"/>
+                <a:gd name="connsiteY2" fmla="*/ 1125415 h 1128876"/>
+                <a:gd name="connsiteX0" fmla="*/ 0 w 3225521"/>
+                <a:gd name="connsiteY0" fmla="*/ 0 h 1125498"/>
+                <a:gd name="connsiteX1" fmla="*/ 1684774 w 3225521"/>
+                <a:gd name="connsiteY1" fmla="*/ 323222 h 1125498"/>
+                <a:gd name="connsiteX2" fmla="*/ 3225521 w 3225521"/>
+                <a:gd name="connsiteY2" fmla="*/ 1125415 h 1125498"/>
+                <a:gd name="connsiteX0" fmla="*/ 0 w 2670349"/>
+                <a:gd name="connsiteY0" fmla="*/ 0 h 376466"/>
+                <a:gd name="connsiteX1" fmla="*/ 1684774 w 2670349"/>
+                <a:gd name="connsiteY1" fmla="*/ 323222 h 376466"/>
+                <a:gd name="connsiteX2" fmla="*/ 2670349 w 2670349"/>
+                <a:gd name="connsiteY2" fmla="*/ 134815 h 376466"/>
+                <a:gd name="connsiteX0" fmla="*/ 0 w 2670349"/>
+                <a:gd name="connsiteY0" fmla="*/ 0 h 319159"/>
+                <a:gd name="connsiteX1" fmla="*/ 1107831 w 2670349"/>
+                <a:gd name="connsiteY1" fmla="*/ 257908 h 319159"/>
+                <a:gd name="connsiteX2" fmla="*/ 2670349 w 2670349"/>
+                <a:gd name="connsiteY2" fmla="*/ 134815 h 319159"/>
+                <a:gd name="connsiteX0" fmla="*/ 0 w 2670349"/>
+                <a:gd name="connsiteY0" fmla="*/ 0 h 319159"/>
+                <a:gd name="connsiteX1" fmla="*/ 1107831 w 2670349"/>
+                <a:gd name="connsiteY1" fmla="*/ 257908 h 319159"/>
+                <a:gd name="connsiteX2" fmla="*/ 2670349 w 2670349"/>
+                <a:gd name="connsiteY2" fmla="*/ 134815 h 319159"/>
+                <a:gd name="connsiteX0" fmla="*/ 0 w 2670349"/>
+                <a:gd name="connsiteY0" fmla="*/ 0 h 284580"/>
+                <a:gd name="connsiteX1" fmla="*/ 1107831 w 2670349"/>
+                <a:gd name="connsiteY1" fmla="*/ 257908 h 284580"/>
+                <a:gd name="connsiteX2" fmla="*/ 2670349 w 2670349"/>
+                <a:gd name="connsiteY2" fmla="*/ 134815 h 284580"/>
+                <a:gd name="connsiteX0" fmla="*/ 0 w 2670349"/>
+                <a:gd name="connsiteY0" fmla="*/ 0 h 511885"/>
+                <a:gd name="connsiteX1" fmla="*/ 1140488 w 2670349"/>
+                <a:gd name="connsiteY1" fmla="*/ 497394 h 511885"/>
+                <a:gd name="connsiteX2" fmla="*/ 2670349 w 2670349"/>
+                <a:gd name="connsiteY2" fmla="*/ 134815 h 511885"/>
+                <a:gd name="connsiteX0" fmla="*/ 0 w 2670349"/>
+                <a:gd name="connsiteY0" fmla="*/ 0 h 511885"/>
+                <a:gd name="connsiteX1" fmla="*/ 1140488 w 2670349"/>
+                <a:gd name="connsiteY1" fmla="*/ 497394 h 511885"/>
+                <a:gd name="connsiteX2" fmla="*/ 2670349 w 2670349"/>
+                <a:gd name="connsiteY2" fmla="*/ 134815 h 511885"/>
+                <a:gd name="connsiteX0" fmla="*/ 0 w 2670349"/>
+                <a:gd name="connsiteY0" fmla="*/ 0 h 511885"/>
+                <a:gd name="connsiteX1" fmla="*/ 1140488 w 2670349"/>
+                <a:gd name="connsiteY1" fmla="*/ 497394 h 511885"/>
+                <a:gd name="connsiteX2" fmla="*/ 2670349 w 2670349"/>
+                <a:gd name="connsiteY2" fmla="*/ 134815 h 511885"/>
+                <a:gd name="connsiteX0" fmla="*/ 0 w 2670349"/>
+                <a:gd name="connsiteY0" fmla="*/ 0 h 822116"/>
+                <a:gd name="connsiteX1" fmla="*/ 1129602 w 2670349"/>
+                <a:gd name="connsiteY1" fmla="*/ 813079 h 822116"/>
+                <a:gd name="connsiteX2" fmla="*/ 2670349 w 2670349"/>
+                <a:gd name="connsiteY2" fmla="*/ 134815 h 822116"/>
+                <a:gd name="connsiteX0" fmla="*/ 0 w 2670349"/>
+                <a:gd name="connsiteY0" fmla="*/ 0 h 822116"/>
+                <a:gd name="connsiteX1" fmla="*/ 1129602 w 2670349"/>
+                <a:gd name="connsiteY1" fmla="*/ 813079 h 822116"/>
+                <a:gd name="connsiteX2" fmla="*/ 2670349 w 2670349"/>
+                <a:gd name="connsiteY2" fmla="*/ 134815 h 822116"/>
+                <a:gd name="connsiteX0" fmla="*/ 0 w 2670349"/>
+                <a:gd name="connsiteY0" fmla="*/ 0 h 822116"/>
+                <a:gd name="connsiteX1" fmla="*/ 1129602 w 2670349"/>
+                <a:gd name="connsiteY1" fmla="*/ 813079 h 822116"/>
+                <a:gd name="connsiteX2" fmla="*/ 2670349 w 2670349"/>
+                <a:gd name="connsiteY2" fmla="*/ 134815 h 822116"/>
+                <a:gd name="connsiteX0" fmla="*/ 0 w 2670349"/>
+                <a:gd name="connsiteY0" fmla="*/ 0 h 438152"/>
+                <a:gd name="connsiteX1" fmla="*/ 1238459 w 2670349"/>
+                <a:gd name="connsiteY1" fmla="*/ 421193 h 438152"/>
+                <a:gd name="connsiteX2" fmla="*/ 2670349 w 2670349"/>
+                <a:gd name="connsiteY2" fmla="*/ 134815 h 438152"/>
+                <a:gd name="connsiteX0" fmla="*/ 0 w 2670349"/>
+                <a:gd name="connsiteY0" fmla="*/ 0 h 439421"/>
+                <a:gd name="connsiteX1" fmla="*/ 1238459 w 2670349"/>
+                <a:gd name="connsiteY1" fmla="*/ 421193 h 439421"/>
+                <a:gd name="connsiteX2" fmla="*/ 2670349 w 2670349"/>
+                <a:gd name="connsiteY2" fmla="*/ 134815 h 439421"/>
+                <a:gd name="connsiteX0" fmla="*/ 0 w 2670349"/>
+                <a:gd name="connsiteY0" fmla="*/ 0 h 326953"/>
+                <a:gd name="connsiteX1" fmla="*/ 1271116 w 2670349"/>
+                <a:gd name="connsiteY1" fmla="*/ 301450 h 326953"/>
+                <a:gd name="connsiteX2" fmla="*/ 2670349 w 2670349"/>
+                <a:gd name="connsiteY2" fmla="*/ 134815 h 326953"/>
+                <a:gd name="connsiteX0" fmla="*/ 0 w 2670349"/>
+                <a:gd name="connsiteY0" fmla="*/ 0 h 326953"/>
+                <a:gd name="connsiteX1" fmla="*/ 1271116 w 2670349"/>
+                <a:gd name="connsiteY1" fmla="*/ 301450 h 326953"/>
+                <a:gd name="connsiteX2" fmla="*/ 2670349 w 2670349"/>
+                <a:gd name="connsiteY2" fmla="*/ 134815 h 326953"/>
+                <a:gd name="connsiteX0" fmla="*/ 0 w 2670349"/>
+                <a:gd name="connsiteY0" fmla="*/ 0 h 408305"/>
+                <a:gd name="connsiteX1" fmla="*/ 1249344 w 2670349"/>
+                <a:gd name="connsiteY1" fmla="*/ 388535 h 408305"/>
+                <a:gd name="connsiteX2" fmla="*/ 2670349 w 2670349"/>
+                <a:gd name="connsiteY2" fmla="*/ 134815 h 408305"/>
+                <a:gd name="connsiteX0" fmla="*/ 0 w 2670349"/>
+                <a:gd name="connsiteY0" fmla="*/ 0 h 408305"/>
+                <a:gd name="connsiteX1" fmla="*/ 1249344 w 2670349"/>
+                <a:gd name="connsiteY1" fmla="*/ 388535 h 408305"/>
+                <a:gd name="connsiteX2" fmla="*/ 2670349 w 2670349"/>
+                <a:gd name="connsiteY2" fmla="*/ 134815 h 408305"/>
+                <a:gd name="connsiteX0" fmla="*/ 0 w 2670349"/>
+                <a:gd name="connsiteY0" fmla="*/ 0 h 388556"/>
+                <a:gd name="connsiteX1" fmla="*/ 1249344 w 2670349"/>
+                <a:gd name="connsiteY1" fmla="*/ 388535 h 388556"/>
+                <a:gd name="connsiteX2" fmla="*/ 2670349 w 2670349"/>
+                <a:gd name="connsiteY2" fmla="*/ 134815 h 388556"/>
+                <a:gd name="connsiteX0" fmla="*/ 0 w 2693495"/>
+                <a:gd name="connsiteY0" fmla="*/ 0 h 526825"/>
+                <a:gd name="connsiteX1" fmla="*/ 1272490 w 2693495"/>
+                <a:gd name="connsiteY1" fmla="*/ 526804 h 526825"/>
+                <a:gd name="connsiteX2" fmla="*/ 2693495 w 2693495"/>
+                <a:gd name="connsiteY2" fmla="*/ 273084 h 526825"/>
+                <a:gd name="connsiteX0" fmla="*/ 0 w 2646746"/>
+                <a:gd name="connsiteY0" fmla="*/ 0 h 495493"/>
+                <a:gd name="connsiteX1" fmla="*/ 1225741 w 2646746"/>
+                <a:gd name="connsiteY1" fmla="*/ 495472 h 495493"/>
+                <a:gd name="connsiteX2" fmla="*/ 2646746 w 2646746"/>
+                <a:gd name="connsiteY2" fmla="*/ 241752 h 495493"/>
+              </a:gdLst>
+              <a:ahLst/>
+              <a:cxnLst>
+                <a:cxn ang="0">
+                  <a:pos x="connsiteX0" y="connsiteY0"/>
+                </a:cxn>
+                <a:cxn ang="0">
+                  <a:pos x="connsiteX1" y="connsiteY1"/>
+                </a:cxn>
+                <a:cxn ang="0">
+                  <a:pos x="connsiteX2" y="connsiteY2"/>
+                </a:cxn>
+              </a:cxnLst>
+              <a:rect l="l" t="t" r="r" b="b"/>
+              <a:pathLst>
+                <a:path w="2646746" h="495493">
+                  <a:moveTo>
+                    <a:pt x="0" y="0"/>
+                  </a:moveTo>
+                  <a:cubicBezTo>
+                    <a:pt x="40193" y="67826"/>
+                    <a:pt x="165639" y="482074"/>
+                    <a:pt x="1225741" y="495472"/>
+                  </a:cubicBezTo>
+                  <a:cubicBezTo>
+                    <a:pt x="2449128" y="497984"/>
+                    <a:pt x="2635023" y="282782"/>
+                    <a:pt x="2646746" y="241752"/>
+                  </a:cubicBezTo>
+                </a:path>
+              </a:pathLst>
+            </a:custGeom>
+            <a:noFill/>
+            <a:ln w="57150">
+              <a:solidFill>
+                <a:srgbClr val="C00000"/>
+              </a:solidFill>
+            </a:ln>
+          </p:spPr>
+          <p:style>
+            <a:lnRef idx="2">
+              <a:schemeClr val="accent1">
+                <a:shade val="50000"/>
+              </a:schemeClr>
+            </a:lnRef>
+            <a:fillRef idx="1">
+              <a:schemeClr val="accent1"/>
+            </a:fillRef>
+            <a:effectRef idx="0">
+              <a:schemeClr val="accent1"/>
+            </a:effectRef>
+            <a:fontRef idx="minor">
+              <a:schemeClr val="lt1"/>
+            </a:fontRef>
+          </p:style>
+          <p:txBody>
+            <a:bodyPr rtlCol="0" anchor="ctr"/>
+            <a:lstStyle/>
+            <a:p>
+              <a:pPr algn="ctr"/>
+              <a:endParaRPr lang="en-US" dirty="0"/>
+            </a:p>
+          </p:txBody>
+        </p:sp>
+        <p:sp>
+          <p:nvSpPr>
+            <p:cNvPr id="9" name="Isosceles Triangle 8">
+              <a:extLst>
+                <a:ext uri="{FF2B5EF4-FFF2-40B4-BE49-F238E27FC236}">
+                  <a16:creationId xmlns:a16="http://schemas.microsoft.com/office/drawing/2014/main" id="{B7AF02AA-CF5E-B94F-40A1-4B640BBA9FA9}"/>
+                </a:ext>
+              </a:extLst>
+            </p:cNvPr>
+            <p:cNvSpPr/>
+            <p:nvPr/>
+          </p:nvSpPr>
+          <p:spPr>
+            <a:xfrm rot="9178233" flipV="1">
+              <a:off x="2486390" y="3889687"/>
+              <a:ext cx="357400" cy="160175"/>
+            </a:xfrm>
+            <a:prstGeom prst="triangle">
+              <a:avLst/>
+            </a:prstGeom>
+            <a:solidFill>
+              <a:srgbClr val="C00000"/>
+            </a:solidFill>
+            <a:ln>
+              <a:noFill/>
+            </a:ln>
+          </p:spPr>
+          <p:style>
+            <a:lnRef idx="2">
+              <a:schemeClr val="accent1">
+                <a:shade val="50000"/>
+              </a:schemeClr>
+            </a:lnRef>
+            <a:fillRef idx="1">
+              <a:schemeClr val="accent1"/>
+            </a:fillRef>
+            <a:effectRef idx="0">
+              <a:schemeClr val="accent1"/>
+            </a:effectRef>
+            <a:fontRef idx="minor">
+              <a:schemeClr val="lt1"/>
+            </a:fontRef>
+          </p:style>
+          <p:txBody>
+            <a:bodyPr rtlCol="0" anchor="ctr"/>
+            <a:lstStyle/>
+            <a:p>
+              <a:pPr algn="ctr"/>
+              <a:endParaRPr lang="en-US" dirty="0"/>
+            </a:p>
+          </p:txBody>
+        </p:sp>
+      </p:grpSp>
     </p:spTree>
     <p:extLst>
       <p:ext uri="{BB962C8B-B14F-4D97-AF65-F5344CB8AC3E}">
-        <p14:creationId xmlns:p14="http://schemas.microsoft.com/office/powerpoint/2010/main" val="2227453336"/>
+        <p14:creationId xmlns:p14="http://schemas.microsoft.com/office/powerpoint/2010/main" val="1364890046"/>
       </p:ext>
     </p:extLst>
   </p:cSld>
   <p:clrMapOvr>
     <a:masterClrMapping/>
   </p:clrMapOvr>
+  <p:timing>
+    <p:tnLst>
+      <p:par>
+        <p:cTn id="1" dur="indefinite" restart="never" nodeType="tmRoot">
+          <p:childTnLst>
+            <p:seq concurrent="1" nextAc="seek">
+              <p:cTn id="2" dur="indefinite" nodeType="mainSeq">
+                <p:childTnLst>
+                  <p:par>
+                    <p:cTn id="3" fill="hold">
+                      <p:stCondLst>
+                        <p:cond delay="indefinite"/>
+                        <p:cond evt="onBegin" delay="0">
+                          <p:tn val="2"/>
+                        </p:cond>
+                      </p:stCondLst>
+                      <p:childTnLst>
+                        <p:par>
+                          <p:cTn id="4" fill="hold">
+                            <p:stCondLst>
+                              <p:cond delay="0"/>
+                            </p:stCondLst>
+                            <p:childTnLst>
+                              <p:par>
+                                <p:cTn id="5" presetID="1" presetClass="entr" presetSubtype="0" fill="hold" grpId="0" nodeType="withEffect">
+                                  <p:stCondLst>
+                                    <p:cond delay="0"/>
+                                  </p:stCondLst>
+                                  <p:childTnLst>
+                                    <p:set>
+                                      <p:cBhvr>
+                                        <p:cTn id="6" dur="1" fill="hold">
+                                          <p:stCondLst>
+                                            <p:cond delay="0"/>
+                                          </p:stCondLst>
+                                        </p:cTn>
+                                        <p:tgtEl>
+                                          <p:spTgt spid="6"/>
+                                        </p:tgtEl>
+                                        <p:attrNameLst>
+                                          <p:attrName>style.visibility</p:attrName>
+                                        </p:attrNameLst>
+                                      </p:cBhvr>
+                                      <p:to>
+                                        <p:strVal val="visible"/>
+                                      </p:to>
+                                    </p:set>
+                                  </p:childTnLst>
+                                </p:cTn>
+                              </p:par>
+                              <p:par>
+                                <p:cTn id="7" presetID="1" presetClass="exit" presetSubtype="0" fill="hold" grpId="1" nodeType="withEffect">
+                                  <p:stCondLst>
+                                    <p:cond delay="0"/>
+                                  </p:stCondLst>
+                                  <p:childTnLst>
+                                    <p:set>
+                                      <p:cBhvr>
+                                        <p:cTn id="8" dur="1" fill="hold">
+                                          <p:stCondLst>
+                                            <p:cond delay="0"/>
+                                          </p:stCondLst>
+                                        </p:cTn>
+                                        <p:tgtEl>
+                                          <p:spTgt spid="6"/>
+                                        </p:tgtEl>
+                                        <p:attrNameLst>
+                                          <p:attrName>style.visibility</p:attrName>
+                                        </p:attrNameLst>
+                                      </p:cBhvr>
+                                      <p:to>
+                                        <p:strVal val="hidden"/>
+                                      </p:to>
+                                    </p:set>
+                                  </p:childTnLst>
+                                </p:cTn>
+                              </p:par>
+                              <p:par>
+                                <p:cTn id="9" presetID="1" presetClass="entr" presetSubtype="0" fill="hold" nodeType="withEffect">
+                                  <p:stCondLst>
+                                    <p:cond delay="0"/>
+                                  </p:stCondLst>
+                                  <p:childTnLst>
+                                    <p:set>
+                                      <p:cBhvr>
+                                        <p:cTn id="10" dur="1" fill="hold">
+                                          <p:stCondLst>
+                                            <p:cond delay="0"/>
+                                          </p:stCondLst>
+                                        </p:cTn>
+                                        <p:tgtEl>
+                                          <p:spTgt spid="7"/>
+                                        </p:tgtEl>
+                                        <p:attrNameLst>
+                                          <p:attrName>style.visibility</p:attrName>
+                                        </p:attrNameLst>
+                                      </p:cBhvr>
+                                      <p:to>
+                                        <p:strVal val="visible"/>
+                                      </p:to>
+                                    </p:set>
+                                  </p:childTnLst>
+                                </p:cTn>
+                              </p:par>
+                            </p:childTnLst>
+                          </p:cTn>
+                        </p:par>
+                      </p:childTnLst>
+                    </p:cTn>
+                  </p:par>
+                </p:childTnLst>
+              </p:cTn>
+              <p:prevCondLst>
+                <p:cond evt="onPrev" delay="0">
+                  <p:tgtEl>
+                    <p:sldTgt/>
+                  </p:tgtEl>
+                </p:cond>
+              </p:prevCondLst>
+              <p:nextCondLst>
+                <p:cond evt="onNext" delay="0">
+                  <p:tgtEl>
+                    <p:sldTgt/>
+                  </p:tgtEl>
+                </p:cond>
+              </p:nextCondLst>
+            </p:seq>
+          </p:childTnLst>
+        </p:cTn>
+      </p:par>
+    </p:tnLst>
+    <p:bldLst>
+      <p:bldP spid="6" grpId="0" animBg="1"/>
+      <p:bldP spid="6" grpId="1" animBg="1"/>
+    </p:bldLst>
+  </p:timing>
 </p:sld>
 </file>
 

</xml_diff>